<commit_message>
Item 26 : Generics
</commit_message>
<xml_diff>
--- a/effective-java.pptx
+++ b/effective-java.pptx
@@ -17,6 +17,7 @@
     <p:sldId id="262" r:id="rId11"/>
     <p:sldId id="263" r:id="rId12"/>
     <p:sldId id="267" r:id="rId13"/>
+    <p:sldId id="268" r:id="rId14"/>
   </p:sldIdLst>
   <p:sldSz cx="12192000" cy="6858000"/>
   <p:notesSz cx="6858000" cy="9144000"/>
@@ -252,7 +253,7 @@
           <a:p>
             <a:fld id="{755BA608-1639-41EA-B572-74EA19863A33}" type="datetimeFigureOut">
               <a:rPr lang="fr-FR" smtClean="0"/>
-              <a:t>09/07/2019</a:t>
+              <a:t>13/09/2019</a:t>
             </a:fld>
             <a:endParaRPr lang="fr-FR"/>
           </a:p>
@@ -294,7 +295,7 @@
           <a:p>
             <a:fld id="{6DABBBE8-4F33-445F-BAB7-1C9BE9D4933C}" type="slidenum">
               <a:rPr lang="fr-FR" smtClean="0"/>
-              <a:t>‹N°›</a:t>
+              <a:t>‹#›</a:t>
             </a:fld>
             <a:endParaRPr lang="fr-FR"/>
           </a:p>
@@ -420,7 +421,7 @@
           <a:p>
             <a:fld id="{755BA608-1639-41EA-B572-74EA19863A33}" type="datetimeFigureOut">
               <a:rPr lang="fr-FR" smtClean="0"/>
-              <a:t>09/07/2019</a:t>
+              <a:t>13/09/2019</a:t>
             </a:fld>
             <a:endParaRPr lang="fr-FR"/>
           </a:p>
@@ -462,7 +463,7 @@
           <a:p>
             <a:fld id="{6DABBBE8-4F33-445F-BAB7-1C9BE9D4933C}" type="slidenum">
               <a:rPr lang="fr-FR" smtClean="0"/>
-              <a:t>‹N°›</a:t>
+              <a:t>‹#›</a:t>
             </a:fld>
             <a:endParaRPr lang="fr-FR"/>
           </a:p>
@@ -598,7 +599,7 @@
           <a:p>
             <a:fld id="{755BA608-1639-41EA-B572-74EA19863A33}" type="datetimeFigureOut">
               <a:rPr lang="fr-FR" smtClean="0"/>
-              <a:t>09/07/2019</a:t>
+              <a:t>13/09/2019</a:t>
             </a:fld>
             <a:endParaRPr lang="fr-FR"/>
           </a:p>
@@ -640,7 +641,7 @@
           <a:p>
             <a:fld id="{6DABBBE8-4F33-445F-BAB7-1C9BE9D4933C}" type="slidenum">
               <a:rPr lang="fr-FR" smtClean="0"/>
-              <a:t>‹N°›</a:t>
+              <a:t>‹#›</a:t>
             </a:fld>
             <a:endParaRPr lang="fr-FR"/>
           </a:p>
@@ -766,7 +767,7 @@
           <a:p>
             <a:fld id="{755BA608-1639-41EA-B572-74EA19863A33}" type="datetimeFigureOut">
               <a:rPr lang="fr-FR" smtClean="0"/>
-              <a:t>09/07/2019</a:t>
+              <a:t>13/09/2019</a:t>
             </a:fld>
             <a:endParaRPr lang="fr-FR"/>
           </a:p>
@@ -808,7 +809,7 @@
           <a:p>
             <a:fld id="{6DABBBE8-4F33-445F-BAB7-1C9BE9D4933C}" type="slidenum">
               <a:rPr lang="fr-FR" smtClean="0"/>
-              <a:t>‹N°›</a:t>
+              <a:t>‹#›</a:t>
             </a:fld>
             <a:endParaRPr lang="fr-FR"/>
           </a:p>
@@ -1011,7 +1012,7 @@
           <a:p>
             <a:fld id="{755BA608-1639-41EA-B572-74EA19863A33}" type="datetimeFigureOut">
               <a:rPr lang="fr-FR" smtClean="0"/>
-              <a:t>09/07/2019</a:t>
+              <a:t>13/09/2019</a:t>
             </a:fld>
             <a:endParaRPr lang="fr-FR"/>
           </a:p>
@@ -1053,7 +1054,7 @@
           <a:p>
             <a:fld id="{6DABBBE8-4F33-445F-BAB7-1C9BE9D4933C}" type="slidenum">
               <a:rPr lang="fr-FR" smtClean="0"/>
-              <a:t>‹N°›</a:t>
+              <a:t>‹#›</a:t>
             </a:fld>
             <a:endParaRPr lang="fr-FR"/>
           </a:p>
@@ -1240,7 +1241,7 @@
           <a:p>
             <a:fld id="{755BA608-1639-41EA-B572-74EA19863A33}" type="datetimeFigureOut">
               <a:rPr lang="fr-FR" smtClean="0"/>
-              <a:t>09/07/2019</a:t>
+              <a:t>13/09/2019</a:t>
             </a:fld>
             <a:endParaRPr lang="fr-FR"/>
           </a:p>
@@ -1282,7 +1283,7 @@
           <a:p>
             <a:fld id="{6DABBBE8-4F33-445F-BAB7-1C9BE9D4933C}" type="slidenum">
               <a:rPr lang="fr-FR" smtClean="0"/>
-              <a:t>‹N°›</a:t>
+              <a:t>‹#›</a:t>
             </a:fld>
             <a:endParaRPr lang="fr-FR"/>
           </a:p>
@@ -1604,7 +1605,7 @@
           <a:p>
             <a:fld id="{755BA608-1639-41EA-B572-74EA19863A33}" type="datetimeFigureOut">
               <a:rPr lang="fr-FR" smtClean="0"/>
-              <a:t>09/07/2019</a:t>
+              <a:t>13/09/2019</a:t>
             </a:fld>
             <a:endParaRPr lang="fr-FR"/>
           </a:p>
@@ -1646,7 +1647,7 @@
           <a:p>
             <a:fld id="{6DABBBE8-4F33-445F-BAB7-1C9BE9D4933C}" type="slidenum">
               <a:rPr lang="fr-FR" smtClean="0"/>
-              <a:t>‹N°›</a:t>
+              <a:t>‹#›</a:t>
             </a:fld>
             <a:endParaRPr lang="fr-FR"/>
           </a:p>
@@ -1721,7 +1722,7 @@
           <a:p>
             <a:fld id="{755BA608-1639-41EA-B572-74EA19863A33}" type="datetimeFigureOut">
               <a:rPr lang="fr-FR" smtClean="0"/>
-              <a:t>09/07/2019</a:t>
+              <a:t>13/09/2019</a:t>
             </a:fld>
             <a:endParaRPr lang="fr-FR"/>
           </a:p>
@@ -1763,7 +1764,7 @@
           <a:p>
             <a:fld id="{6DABBBE8-4F33-445F-BAB7-1C9BE9D4933C}" type="slidenum">
               <a:rPr lang="fr-FR" smtClean="0"/>
-              <a:t>‹N°›</a:t>
+              <a:t>‹#›</a:t>
             </a:fld>
             <a:endParaRPr lang="fr-FR"/>
           </a:p>
@@ -1816,7 +1817,7 @@
           <a:p>
             <a:fld id="{755BA608-1639-41EA-B572-74EA19863A33}" type="datetimeFigureOut">
               <a:rPr lang="fr-FR" smtClean="0"/>
-              <a:t>09/07/2019</a:t>
+              <a:t>13/09/2019</a:t>
             </a:fld>
             <a:endParaRPr lang="fr-FR"/>
           </a:p>
@@ -1858,7 +1859,7 @@
           <a:p>
             <a:fld id="{6DABBBE8-4F33-445F-BAB7-1C9BE9D4933C}" type="slidenum">
               <a:rPr lang="fr-FR" smtClean="0"/>
-              <a:t>‹N°›</a:t>
+              <a:t>‹#›</a:t>
             </a:fld>
             <a:endParaRPr lang="fr-FR"/>
           </a:p>
@@ -2091,7 +2092,7 @@
           <a:p>
             <a:fld id="{755BA608-1639-41EA-B572-74EA19863A33}" type="datetimeFigureOut">
               <a:rPr lang="fr-FR" smtClean="0"/>
-              <a:t>09/07/2019</a:t>
+              <a:t>13/09/2019</a:t>
             </a:fld>
             <a:endParaRPr lang="fr-FR"/>
           </a:p>
@@ -2133,7 +2134,7 @@
           <a:p>
             <a:fld id="{6DABBBE8-4F33-445F-BAB7-1C9BE9D4933C}" type="slidenum">
               <a:rPr lang="fr-FR" smtClean="0"/>
-              <a:t>‹N°›</a:t>
+              <a:t>‹#›</a:t>
             </a:fld>
             <a:endParaRPr lang="fr-FR"/>
           </a:p>
@@ -2343,7 +2344,7 @@
           <a:p>
             <a:fld id="{755BA608-1639-41EA-B572-74EA19863A33}" type="datetimeFigureOut">
               <a:rPr lang="fr-FR" smtClean="0"/>
-              <a:t>09/07/2019</a:t>
+              <a:t>13/09/2019</a:t>
             </a:fld>
             <a:endParaRPr lang="fr-FR"/>
           </a:p>
@@ -2385,7 +2386,7 @@
           <a:p>
             <a:fld id="{6DABBBE8-4F33-445F-BAB7-1C9BE9D4933C}" type="slidenum">
               <a:rPr lang="fr-FR" smtClean="0"/>
-              <a:t>‹N°›</a:t>
+              <a:t>‹#›</a:t>
             </a:fld>
             <a:endParaRPr lang="fr-FR"/>
           </a:p>
@@ -2554,7 +2555,7 @@
           <a:p>
             <a:fld id="{755BA608-1639-41EA-B572-74EA19863A33}" type="datetimeFigureOut">
               <a:rPr lang="fr-FR" smtClean="0"/>
-              <a:t>09/07/2019</a:t>
+              <a:t>13/09/2019</a:t>
             </a:fld>
             <a:endParaRPr lang="fr-FR"/>
           </a:p>
@@ -2632,7 +2633,7 @@
           <a:p>
             <a:fld id="{6DABBBE8-4F33-445F-BAB7-1C9BE9D4933C}" type="slidenum">
               <a:rPr lang="fr-FR" smtClean="0"/>
-              <a:t>‹N°›</a:t>
+              <a:t>‹#›</a:t>
             </a:fld>
             <a:endParaRPr lang="fr-FR"/>
           </a:p>
@@ -5010,6 +5011,688 @@
 </p:sld>
 </file>
 
+<file path=ppt/slides/slide13.xml><?xml version="1.0" encoding="utf-8"?>
+<p:sld xmlns:a="http://schemas.openxmlformats.org/drawingml/2006/main" xmlns:r="http://schemas.openxmlformats.org/officeDocument/2006/relationships" xmlns:p="http://schemas.openxmlformats.org/presentationml/2006/main">
+  <p:cSld>
+    <p:spTree>
+      <p:nvGrpSpPr>
+        <p:cNvPr id="1" name=""/>
+        <p:cNvGrpSpPr/>
+        <p:nvPr/>
+      </p:nvGrpSpPr>
+      <p:grpSpPr>
+        <a:xfrm>
+          <a:off x="0" y="0"/>
+          <a:ext cx="0" cy="0"/>
+          <a:chOff x="0" y="0"/>
+          <a:chExt cx="0" cy="0"/>
+        </a:xfrm>
+      </p:grpSpPr>
+      <p:sp>
+        <p:nvSpPr>
+          <p:cNvPr id="2" name="Titre 1"/>
+          <p:cNvSpPr>
+            <a:spLocks noGrp="1"/>
+          </p:cNvSpPr>
+          <p:nvPr>
+            <p:ph type="ctrTitle"/>
+          </p:nvPr>
+        </p:nvSpPr>
+        <p:spPr>
+          <a:xfrm>
+            <a:off x="1030224" y="384048"/>
+            <a:ext cx="9144000" cy="1287970"/>
+          </a:xfrm>
+        </p:spPr>
+        <p:txBody>
+          <a:bodyPr/>
+          <a:lstStyle/>
+          <a:p>
+            <a:r>
+              <a:rPr lang="fr-FR" dirty="0"/>
+              <a:t>Item 26</a:t>
+            </a:r>
+          </a:p>
+        </p:txBody>
+      </p:sp>
+      <p:sp>
+        <p:nvSpPr>
+          <p:cNvPr id="3" name="Sous-titre 2"/>
+          <p:cNvSpPr>
+            <a:spLocks noGrp="1"/>
+          </p:cNvSpPr>
+          <p:nvPr>
+            <p:ph type="subTitle" idx="1"/>
+          </p:nvPr>
+        </p:nvSpPr>
+        <p:spPr>
+          <a:xfrm>
+            <a:off x="1304544" y="1928686"/>
+            <a:ext cx="9144000" cy="4408106"/>
+          </a:xfrm>
+        </p:spPr>
+        <p:txBody>
+          <a:bodyPr>
+            <a:noAutofit/>
+          </a:bodyPr>
+          <a:lstStyle/>
+          <a:p>
+            <a:pPr algn="l"/>
+            <a:r>
+              <a:rPr lang="en-US" sz="2000" dirty="0"/>
+              <a:t>How to declare a collection of objects?</a:t>
+            </a:r>
+          </a:p>
+          <a:p>
+            <a:pPr algn="l"/>
+            <a:r>
+              <a:rPr lang="en-US" sz="2000" b="1" dirty="0">
+                <a:solidFill>
+                  <a:srgbClr val="0070C0"/>
+                </a:solidFill>
+                <a:sym typeface="Wingdings" panose="05000000000000000000" pitchFamily="2" charset="2"/>
+              </a:rPr>
+              <a:t>            Simply use raw collection:  “ private final Collection </a:t>
+            </a:r>
+            <a:r>
+              <a:rPr lang="en-US" sz="2000" b="1" dirty="0" err="1">
+                <a:solidFill>
+                  <a:srgbClr val="0070C0"/>
+                </a:solidFill>
+                <a:sym typeface="Wingdings" panose="05000000000000000000" pitchFamily="2" charset="2"/>
+              </a:rPr>
+              <a:t>myList</a:t>
+            </a:r>
+            <a:r>
+              <a:rPr lang="en-US" sz="2000" b="1" dirty="0">
+                <a:solidFill>
+                  <a:srgbClr val="0070C0"/>
+                </a:solidFill>
+                <a:sym typeface="Wingdings" panose="05000000000000000000" pitchFamily="2" charset="2"/>
+              </a:rPr>
+              <a:t>  = …. “</a:t>
+            </a:r>
+          </a:p>
+          <a:p>
+            <a:pPr algn="l"/>
+            <a:endParaRPr lang="en-US" sz="2000" dirty="0"/>
+          </a:p>
+          <a:p>
+            <a:pPr algn="l"/>
+            <a:r>
+              <a:rPr lang="en-US" sz="2000" dirty="0"/>
+              <a:t>But what if:</a:t>
+            </a:r>
+          </a:p>
+          <a:p>
+            <a:pPr marL="342900" indent="-342900" algn="l">
+              <a:buFont typeface="Wingdings" panose="05000000000000000000" pitchFamily="2" charset="2"/>
+              <a:buChar char="q"/>
+            </a:pPr>
+            <a:r>
+              <a:rPr lang="en-US" sz="2000" dirty="0"/>
+              <a:t>I want to avoid casting very object I read from the collection?</a:t>
+            </a:r>
+          </a:p>
+          <a:p>
+            <a:pPr marL="342900" indent="-342900" algn="l">
+              <a:buFont typeface="Wingdings" panose="05000000000000000000" pitchFamily="2" charset="2"/>
+              <a:buChar char="q"/>
+            </a:pPr>
+            <a:r>
+              <a:rPr lang="en-US" sz="2000" dirty="0"/>
+              <a:t>I want to control what is inserted in my collection?</a:t>
+            </a:r>
+          </a:p>
+          <a:p>
+            <a:pPr algn="l"/>
+            <a:endParaRPr lang="en-US" sz="2000" dirty="0"/>
+          </a:p>
+        </p:txBody>
+      </p:sp>
+      <p:sp>
+        <p:nvSpPr>
+          <p:cNvPr id="4" name="Rectangle 3"/>
+          <p:cNvSpPr/>
+          <p:nvPr/>
+        </p:nvSpPr>
+        <p:spPr>
+          <a:xfrm>
+            <a:off x="3685658" y="5097887"/>
+            <a:ext cx="4875565" cy="523220"/>
+          </a:xfrm>
+          <a:prstGeom prst="rect">
+            <a:avLst/>
+          </a:prstGeom>
+          <a:noFill/>
+        </p:spPr>
+        <p:txBody>
+          <a:bodyPr wrap="none" lIns="91440" tIns="45720" rIns="91440" bIns="45720">
+            <a:spAutoFit/>
+          </a:bodyPr>
+          <a:lstStyle/>
+          <a:p>
+            <a:pPr algn="ctr"/>
+            <a:r>
+              <a:rPr lang="en-US" sz="2800" b="1" dirty="0">
+                <a:ln w="22225">
+                  <a:solidFill>
+                    <a:schemeClr val="accent2"/>
+                  </a:solidFill>
+                  <a:prstDash val="solid"/>
+                </a:ln>
+                <a:solidFill>
+                  <a:schemeClr val="accent2">
+                    <a:lumMod val="40000"/>
+                    <a:lumOff val="60000"/>
+                  </a:schemeClr>
+                </a:solidFill>
+              </a:rPr>
+              <a:t>Generics (java 5) to the rescue</a:t>
+            </a:r>
+            <a:endParaRPr lang="fr-FR" sz="2800" b="1" cap="none" spc="0" dirty="0">
+              <a:ln w="22225">
+                <a:solidFill>
+                  <a:schemeClr val="accent2"/>
+                </a:solidFill>
+                <a:prstDash val="solid"/>
+              </a:ln>
+              <a:solidFill>
+                <a:schemeClr val="accent2">
+                  <a:lumMod val="40000"/>
+                  <a:lumOff val="60000"/>
+                </a:schemeClr>
+              </a:solidFill>
+              <a:effectLst/>
+            </a:endParaRPr>
+          </a:p>
+        </p:txBody>
+      </p:sp>
+    </p:spTree>
+    <p:extLst>
+      <p:ext uri="{BB962C8B-B14F-4D97-AF65-F5344CB8AC3E}">
+        <p14:creationId xmlns:p14="http://schemas.microsoft.com/office/powerpoint/2010/main" val="2891972775"/>
+      </p:ext>
+    </p:extLst>
+  </p:cSld>
+  <p:clrMapOvr>
+    <a:masterClrMapping/>
+  </p:clrMapOvr>
+  <p:timing>
+    <p:tnLst>
+      <p:par>
+        <p:cTn id="1" dur="indefinite" restart="never" nodeType="tmRoot">
+          <p:childTnLst>
+            <p:seq concurrent="1" nextAc="seek">
+              <p:cTn id="2" dur="indefinite" nodeType="mainSeq">
+                <p:childTnLst>
+                  <p:par>
+                    <p:cTn id="3" fill="hold">
+                      <p:stCondLst>
+                        <p:cond delay="indefinite"/>
+                      </p:stCondLst>
+                      <p:childTnLst>
+                        <p:par>
+                          <p:cTn id="4" fill="hold">
+                            <p:stCondLst>
+                              <p:cond delay="0"/>
+                            </p:stCondLst>
+                            <p:childTnLst>
+                              <p:par>
+                                <p:cTn id="5" presetID="1" presetClass="entr" presetSubtype="0" fill="hold" nodeType="clickEffect">
+                                  <p:stCondLst>
+                                    <p:cond delay="0"/>
+                                  </p:stCondLst>
+                                  <p:childTnLst>
+                                    <p:set>
+                                      <p:cBhvr>
+                                        <p:cTn id="6" dur="1" fill="hold">
+                                          <p:stCondLst>
+                                            <p:cond delay="0"/>
+                                          </p:stCondLst>
+                                        </p:cTn>
+                                        <p:tgtEl>
+                                          <p:spTgt spid="3">
+                                            <p:txEl>
+                                              <p:pRg st="1" end="1"/>
+                                            </p:txEl>
+                                          </p:spTgt>
+                                        </p:tgtEl>
+                                        <p:attrNameLst>
+                                          <p:attrName>style.visibility</p:attrName>
+                                        </p:attrNameLst>
+                                      </p:cBhvr>
+                                      <p:to>
+                                        <p:strVal val="visible"/>
+                                      </p:to>
+                                    </p:set>
+                                  </p:childTnLst>
+                                </p:cTn>
+                              </p:par>
+                            </p:childTnLst>
+                          </p:cTn>
+                        </p:par>
+                      </p:childTnLst>
+                    </p:cTn>
+                  </p:par>
+                  <p:par>
+                    <p:cTn id="7" fill="hold">
+                      <p:stCondLst>
+                        <p:cond delay="indefinite"/>
+                      </p:stCondLst>
+                      <p:childTnLst>
+                        <p:par>
+                          <p:cTn id="8" fill="hold">
+                            <p:stCondLst>
+                              <p:cond delay="0"/>
+                            </p:stCondLst>
+                            <p:childTnLst>
+                              <p:par>
+                                <p:cTn id="9" presetID="2" presetClass="entr" presetSubtype="4" fill="hold" nodeType="clickEffect">
+                                  <p:stCondLst>
+                                    <p:cond delay="0"/>
+                                  </p:stCondLst>
+                                  <p:childTnLst>
+                                    <p:set>
+                                      <p:cBhvr>
+                                        <p:cTn id="10" dur="1" fill="hold">
+                                          <p:stCondLst>
+                                            <p:cond delay="0"/>
+                                          </p:stCondLst>
+                                        </p:cTn>
+                                        <p:tgtEl>
+                                          <p:spTgt spid="3">
+                                            <p:txEl>
+                                              <p:pRg st="3" end="3"/>
+                                            </p:txEl>
+                                          </p:spTgt>
+                                        </p:tgtEl>
+                                        <p:attrNameLst>
+                                          <p:attrName>style.visibility</p:attrName>
+                                        </p:attrNameLst>
+                                      </p:cBhvr>
+                                      <p:to>
+                                        <p:strVal val="visible"/>
+                                      </p:to>
+                                    </p:set>
+                                    <p:anim calcmode="lin" valueType="num">
+                                      <p:cBhvr additive="base">
+                                        <p:cTn id="11" dur="500" fill="hold"/>
+                                        <p:tgtEl>
+                                          <p:spTgt spid="3">
+                                            <p:txEl>
+                                              <p:pRg st="3" end="3"/>
+                                            </p:txEl>
+                                          </p:spTgt>
+                                        </p:tgtEl>
+                                        <p:attrNameLst>
+                                          <p:attrName>ppt_x</p:attrName>
+                                        </p:attrNameLst>
+                                      </p:cBhvr>
+                                      <p:tavLst>
+                                        <p:tav tm="0">
+                                          <p:val>
+                                            <p:strVal val="#ppt_x"/>
+                                          </p:val>
+                                        </p:tav>
+                                        <p:tav tm="100000">
+                                          <p:val>
+                                            <p:strVal val="#ppt_x"/>
+                                          </p:val>
+                                        </p:tav>
+                                      </p:tavLst>
+                                    </p:anim>
+                                    <p:anim calcmode="lin" valueType="num">
+                                      <p:cBhvr additive="base">
+                                        <p:cTn id="12" dur="500" fill="hold"/>
+                                        <p:tgtEl>
+                                          <p:spTgt spid="3">
+                                            <p:txEl>
+                                              <p:pRg st="3" end="3"/>
+                                            </p:txEl>
+                                          </p:spTgt>
+                                        </p:tgtEl>
+                                        <p:attrNameLst>
+                                          <p:attrName>ppt_y</p:attrName>
+                                        </p:attrNameLst>
+                                      </p:cBhvr>
+                                      <p:tavLst>
+                                        <p:tav tm="0">
+                                          <p:val>
+                                            <p:strVal val="1+#ppt_h/2"/>
+                                          </p:val>
+                                        </p:tav>
+                                        <p:tav tm="100000">
+                                          <p:val>
+                                            <p:strVal val="#ppt_y"/>
+                                          </p:val>
+                                        </p:tav>
+                                      </p:tavLst>
+                                    </p:anim>
+                                  </p:childTnLst>
+                                </p:cTn>
+                              </p:par>
+                            </p:childTnLst>
+                          </p:cTn>
+                        </p:par>
+                      </p:childTnLst>
+                    </p:cTn>
+                  </p:par>
+                  <p:par>
+                    <p:cTn id="13" fill="hold">
+                      <p:stCondLst>
+                        <p:cond delay="indefinite"/>
+                      </p:stCondLst>
+                      <p:childTnLst>
+                        <p:par>
+                          <p:cTn id="14" fill="hold">
+                            <p:stCondLst>
+                              <p:cond delay="0"/>
+                            </p:stCondLst>
+                            <p:childTnLst>
+                              <p:par>
+                                <p:cTn id="15" presetID="2" presetClass="entr" presetSubtype="4" fill="hold" nodeType="clickEffect">
+                                  <p:stCondLst>
+                                    <p:cond delay="0"/>
+                                  </p:stCondLst>
+                                  <p:childTnLst>
+                                    <p:set>
+                                      <p:cBhvr>
+                                        <p:cTn id="16" dur="1" fill="hold">
+                                          <p:stCondLst>
+                                            <p:cond delay="0"/>
+                                          </p:stCondLst>
+                                        </p:cTn>
+                                        <p:tgtEl>
+                                          <p:spTgt spid="3">
+                                            <p:txEl>
+                                              <p:pRg st="4" end="4"/>
+                                            </p:txEl>
+                                          </p:spTgt>
+                                        </p:tgtEl>
+                                        <p:attrNameLst>
+                                          <p:attrName>style.visibility</p:attrName>
+                                        </p:attrNameLst>
+                                      </p:cBhvr>
+                                      <p:to>
+                                        <p:strVal val="visible"/>
+                                      </p:to>
+                                    </p:set>
+                                    <p:anim calcmode="lin" valueType="num">
+                                      <p:cBhvr additive="base">
+                                        <p:cTn id="17" dur="500" fill="hold"/>
+                                        <p:tgtEl>
+                                          <p:spTgt spid="3">
+                                            <p:txEl>
+                                              <p:pRg st="4" end="4"/>
+                                            </p:txEl>
+                                          </p:spTgt>
+                                        </p:tgtEl>
+                                        <p:attrNameLst>
+                                          <p:attrName>ppt_x</p:attrName>
+                                        </p:attrNameLst>
+                                      </p:cBhvr>
+                                      <p:tavLst>
+                                        <p:tav tm="0">
+                                          <p:val>
+                                            <p:strVal val="#ppt_x"/>
+                                          </p:val>
+                                        </p:tav>
+                                        <p:tav tm="100000">
+                                          <p:val>
+                                            <p:strVal val="#ppt_x"/>
+                                          </p:val>
+                                        </p:tav>
+                                      </p:tavLst>
+                                    </p:anim>
+                                    <p:anim calcmode="lin" valueType="num">
+                                      <p:cBhvr additive="base">
+                                        <p:cTn id="18" dur="500" fill="hold"/>
+                                        <p:tgtEl>
+                                          <p:spTgt spid="3">
+                                            <p:txEl>
+                                              <p:pRg st="4" end="4"/>
+                                            </p:txEl>
+                                          </p:spTgt>
+                                        </p:tgtEl>
+                                        <p:attrNameLst>
+                                          <p:attrName>ppt_y</p:attrName>
+                                        </p:attrNameLst>
+                                      </p:cBhvr>
+                                      <p:tavLst>
+                                        <p:tav tm="0">
+                                          <p:val>
+                                            <p:strVal val="1+#ppt_h/2"/>
+                                          </p:val>
+                                        </p:tav>
+                                        <p:tav tm="100000">
+                                          <p:val>
+                                            <p:strVal val="#ppt_y"/>
+                                          </p:val>
+                                        </p:tav>
+                                      </p:tavLst>
+                                    </p:anim>
+                                  </p:childTnLst>
+                                </p:cTn>
+                              </p:par>
+                              <p:par>
+                                <p:cTn id="19" presetID="2" presetClass="entr" presetSubtype="4" fill="hold" nodeType="withEffect">
+                                  <p:stCondLst>
+                                    <p:cond delay="0"/>
+                                  </p:stCondLst>
+                                  <p:childTnLst>
+                                    <p:set>
+                                      <p:cBhvr>
+                                        <p:cTn id="20" dur="1" fill="hold">
+                                          <p:stCondLst>
+                                            <p:cond delay="0"/>
+                                          </p:stCondLst>
+                                        </p:cTn>
+                                        <p:tgtEl>
+                                          <p:spTgt spid="3">
+                                            <p:txEl>
+                                              <p:pRg st="5" end="5"/>
+                                            </p:txEl>
+                                          </p:spTgt>
+                                        </p:tgtEl>
+                                        <p:attrNameLst>
+                                          <p:attrName>style.visibility</p:attrName>
+                                        </p:attrNameLst>
+                                      </p:cBhvr>
+                                      <p:to>
+                                        <p:strVal val="visible"/>
+                                      </p:to>
+                                    </p:set>
+                                    <p:anim calcmode="lin" valueType="num">
+                                      <p:cBhvr additive="base">
+                                        <p:cTn id="21" dur="500" fill="hold"/>
+                                        <p:tgtEl>
+                                          <p:spTgt spid="3">
+                                            <p:txEl>
+                                              <p:pRg st="5" end="5"/>
+                                            </p:txEl>
+                                          </p:spTgt>
+                                        </p:tgtEl>
+                                        <p:attrNameLst>
+                                          <p:attrName>ppt_x</p:attrName>
+                                        </p:attrNameLst>
+                                      </p:cBhvr>
+                                      <p:tavLst>
+                                        <p:tav tm="0">
+                                          <p:val>
+                                            <p:strVal val="#ppt_x"/>
+                                          </p:val>
+                                        </p:tav>
+                                        <p:tav tm="100000">
+                                          <p:val>
+                                            <p:strVal val="#ppt_x"/>
+                                          </p:val>
+                                        </p:tav>
+                                      </p:tavLst>
+                                    </p:anim>
+                                    <p:anim calcmode="lin" valueType="num">
+                                      <p:cBhvr additive="base">
+                                        <p:cTn id="22" dur="500" fill="hold"/>
+                                        <p:tgtEl>
+                                          <p:spTgt spid="3">
+                                            <p:txEl>
+                                              <p:pRg st="5" end="5"/>
+                                            </p:txEl>
+                                          </p:spTgt>
+                                        </p:tgtEl>
+                                        <p:attrNameLst>
+                                          <p:attrName>ppt_y</p:attrName>
+                                        </p:attrNameLst>
+                                      </p:cBhvr>
+                                      <p:tavLst>
+                                        <p:tav tm="0">
+                                          <p:val>
+                                            <p:strVal val="1+#ppt_h/2"/>
+                                          </p:val>
+                                        </p:tav>
+                                        <p:tav tm="100000">
+                                          <p:val>
+                                            <p:strVal val="#ppt_y"/>
+                                          </p:val>
+                                        </p:tav>
+                                      </p:tavLst>
+                                    </p:anim>
+                                  </p:childTnLst>
+                                </p:cTn>
+                              </p:par>
+                            </p:childTnLst>
+                          </p:cTn>
+                        </p:par>
+                      </p:childTnLst>
+                    </p:cTn>
+                  </p:par>
+                  <p:par>
+                    <p:cTn id="23" fill="hold">
+                      <p:stCondLst>
+                        <p:cond delay="indefinite"/>
+                      </p:stCondLst>
+                      <p:childTnLst>
+                        <p:par>
+                          <p:cTn id="24" fill="hold">
+                            <p:stCondLst>
+                              <p:cond delay="0"/>
+                            </p:stCondLst>
+                            <p:childTnLst>
+                              <p:par>
+                                <p:cTn id="25" presetID="53" presetClass="entr" presetSubtype="16" fill="hold" grpId="0" nodeType="clickEffect">
+                                  <p:stCondLst>
+                                    <p:cond delay="0"/>
+                                  </p:stCondLst>
+                                  <p:childTnLst>
+                                    <p:set>
+                                      <p:cBhvr>
+                                        <p:cTn id="26" dur="1" fill="hold">
+                                          <p:stCondLst>
+                                            <p:cond delay="0"/>
+                                          </p:stCondLst>
+                                        </p:cTn>
+                                        <p:tgtEl>
+                                          <p:spTgt spid="4"/>
+                                        </p:tgtEl>
+                                        <p:attrNameLst>
+                                          <p:attrName>style.visibility</p:attrName>
+                                        </p:attrNameLst>
+                                      </p:cBhvr>
+                                      <p:to>
+                                        <p:strVal val="visible"/>
+                                      </p:to>
+                                    </p:set>
+                                    <p:anim calcmode="lin" valueType="num">
+                                      <p:cBhvr>
+                                        <p:cTn id="27" dur="500" fill="hold"/>
+                                        <p:tgtEl>
+                                          <p:spTgt spid="4"/>
+                                        </p:tgtEl>
+                                        <p:attrNameLst>
+                                          <p:attrName>ppt_w</p:attrName>
+                                        </p:attrNameLst>
+                                      </p:cBhvr>
+                                      <p:tavLst>
+                                        <p:tav tm="0">
+                                          <p:val>
+                                            <p:fltVal val="0"/>
+                                          </p:val>
+                                        </p:tav>
+                                        <p:tav tm="100000">
+                                          <p:val>
+                                            <p:strVal val="#ppt_w"/>
+                                          </p:val>
+                                        </p:tav>
+                                      </p:tavLst>
+                                    </p:anim>
+                                    <p:anim calcmode="lin" valueType="num">
+                                      <p:cBhvr>
+                                        <p:cTn id="28" dur="500" fill="hold"/>
+                                        <p:tgtEl>
+                                          <p:spTgt spid="4"/>
+                                        </p:tgtEl>
+                                        <p:attrNameLst>
+                                          <p:attrName>ppt_h</p:attrName>
+                                        </p:attrNameLst>
+                                      </p:cBhvr>
+                                      <p:tavLst>
+                                        <p:tav tm="0">
+                                          <p:val>
+                                            <p:fltVal val="0"/>
+                                          </p:val>
+                                        </p:tav>
+                                        <p:tav tm="100000">
+                                          <p:val>
+                                            <p:strVal val="#ppt_h"/>
+                                          </p:val>
+                                        </p:tav>
+                                      </p:tavLst>
+                                    </p:anim>
+                                    <p:animEffect transition="in" filter="fade">
+                                      <p:cBhvr>
+                                        <p:cTn id="29" dur="500"/>
+                                        <p:tgtEl>
+                                          <p:spTgt spid="4"/>
+                                        </p:tgtEl>
+                                      </p:cBhvr>
+                                    </p:animEffect>
+                                  </p:childTnLst>
+                                </p:cTn>
+                              </p:par>
+                            </p:childTnLst>
+                          </p:cTn>
+                        </p:par>
+                      </p:childTnLst>
+                    </p:cTn>
+                  </p:par>
+                </p:childTnLst>
+              </p:cTn>
+              <p:prevCondLst>
+                <p:cond evt="onPrev" delay="0">
+                  <p:tgtEl>
+                    <p:sldTgt/>
+                  </p:tgtEl>
+                </p:cond>
+              </p:prevCondLst>
+              <p:nextCondLst>
+                <p:cond evt="onNext" delay="0">
+                  <p:tgtEl>
+                    <p:sldTgt/>
+                  </p:tgtEl>
+                </p:cond>
+              </p:nextCondLst>
+            </p:seq>
+          </p:childTnLst>
+        </p:cTn>
+      </p:par>
+    </p:tnLst>
+    <p:bldLst>
+      <p:bldP spid="4" grpId="0"/>
+    </p:bldLst>
+  </p:timing>
+</p:sld>
+</file>
+
 <file path=ppt/slides/slide2.xml><?xml version="1.0" encoding="utf-8"?>
 <p:sld xmlns:a="http://schemas.openxmlformats.org/drawingml/2006/main" xmlns:r="http://schemas.openxmlformats.org/officeDocument/2006/relationships" xmlns:p="http://schemas.openxmlformats.org/presentationml/2006/main">
   <p:cSld>

</xml_diff>

<commit_message>
Item 28 : Generics again
</commit_message>
<xml_diff>
--- a/effective-java.pptx
+++ b/effective-java.pptx
@@ -18,6 +18,7 @@
     <p:sldId id="263" r:id="rId12"/>
     <p:sldId id="267" r:id="rId13"/>
     <p:sldId id="268" r:id="rId14"/>
+    <p:sldId id="269" r:id="rId15"/>
   </p:sldIdLst>
   <p:sldSz cx="12192000" cy="6858000"/>
   <p:notesSz cx="6858000" cy="9144000"/>
@@ -253,7 +254,7 @@
           <a:p>
             <a:fld id="{755BA608-1639-41EA-B572-74EA19863A33}" type="datetimeFigureOut">
               <a:rPr lang="fr-FR" smtClean="0"/>
-              <a:t>13/09/2019</a:t>
+              <a:t>19/09/2019</a:t>
             </a:fld>
             <a:endParaRPr lang="fr-FR"/>
           </a:p>
@@ -421,7 +422,7 @@
           <a:p>
             <a:fld id="{755BA608-1639-41EA-B572-74EA19863A33}" type="datetimeFigureOut">
               <a:rPr lang="fr-FR" smtClean="0"/>
-              <a:t>13/09/2019</a:t>
+              <a:t>19/09/2019</a:t>
             </a:fld>
             <a:endParaRPr lang="fr-FR"/>
           </a:p>
@@ -599,7 +600,7 @@
           <a:p>
             <a:fld id="{755BA608-1639-41EA-B572-74EA19863A33}" type="datetimeFigureOut">
               <a:rPr lang="fr-FR" smtClean="0"/>
-              <a:t>13/09/2019</a:t>
+              <a:t>19/09/2019</a:t>
             </a:fld>
             <a:endParaRPr lang="fr-FR"/>
           </a:p>
@@ -767,7 +768,7 @@
           <a:p>
             <a:fld id="{755BA608-1639-41EA-B572-74EA19863A33}" type="datetimeFigureOut">
               <a:rPr lang="fr-FR" smtClean="0"/>
-              <a:t>13/09/2019</a:t>
+              <a:t>19/09/2019</a:t>
             </a:fld>
             <a:endParaRPr lang="fr-FR"/>
           </a:p>
@@ -1012,7 +1013,7 @@
           <a:p>
             <a:fld id="{755BA608-1639-41EA-B572-74EA19863A33}" type="datetimeFigureOut">
               <a:rPr lang="fr-FR" smtClean="0"/>
-              <a:t>13/09/2019</a:t>
+              <a:t>19/09/2019</a:t>
             </a:fld>
             <a:endParaRPr lang="fr-FR"/>
           </a:p>
@@ -1241,7 +1242,7 @@
           <a:p>
             <a:fld id="{755BA608-1639-41EA-B572-74EA19863A33}" type="datetimeFigureOut">
               <a:rPr lang="fr-FR" smtClean="0"/>
-              <a:t>13/09/2019</a:t>
+              <a:t>19/09/2019</a:t>
             </a:fld>
             <a:endParaRPr lang="fr-FR"/>
           </a:p>
@@ -1605,7 +1606,7 @@
           <a:p>
             <a:fld id="{755BA608-1639-41EA-B572-74EA19863A33}" type="datetimeFigureOut">
               <a:rPr lang="fr-FR" smtClean="0"/>
-              <a:t>13/09/2019</a:t>
+              <a:t>19/09/2019</a:t>
             </a:fld>
             <a:endParaRPr lang="fr-FR"/>
           </a:p>
@@ -1722,7 +1723,7 @@
           <a:p>
             <a:fld id="{755BA608-1639-41EA-B572-74EA19863A33}" type="datetimeFigureOut">
               <a:rPr lang="fr-FR" smtClean="0"/>
-              <a:t>13/09/2019</a:t>
+              <a:t>19/09/2019</a:t>
             </a:fld>
             <a:endParaRPr lang="fr-FR"/>
           </a:p>
@@ -1817,7 +1818,7 @@
           <a:p>
             <a:fld id="{755BA608-1639-41EA-B572-74EA19863A33}" type="datetimeFigureOut">
               <a:rPr lang="fr-FR" smtClean="0"/>
-              <a:t>13/09/2019</a:t>
+              <a:t>19/09/2019</a:t>
             </a:fld>
             <a:endParaRPr lang="fr-FR"/>
           </a:p>
@@ -2092,7 +2093,7 @@
           <a:p>
             <a:fld id="{755BA608-1639-41EA-B572-74EA19863A33}" type="datetimeFigureOut">
               <a:rPr lang="fr-FR" smtClean="0"/>
-              <a:t>13/09/2019</a:t>
+              <a:t>19/09/2019</a:t>
             </a:fld>
             <a:endParaRPr lang="fr-FR"/>
           </a:p>
@@ -2344,7 +2345,7 @@
           <a:p>
             <a:fld id="{755BA608-1639-41EA-B572-74EA19863A33}" type="datetimeFigureOut">
               <a:rPr lang="fr-FR" smtClean="0"/>
-              <a:t>13/09/2019</a:t>
+              <a:t>19/09/2019</a:t>
             </a:fld>
             <a:endParaRPr lang="fr-FR"/>
           </a:p>
@@ -2555,7 +2556,7 @@
           <a:p>
             <a:fld id="{755BA608-1639-41EA-B572-74EA19863A33}" type="datetimeFigureOut">
               <a:rPr lang="fr-FR" smtClean="0"/>
-              <a:t>13/09/2019</a:t>
+              <a:t>19/09/2019</a:t>
             </a:fld>
             <a:endParaRPr lang="fr-FR"/>
           </a:p>
@@ -5693,6 +5694,830 @@
 </p:sld>
 </file>
 
+<file path=ppt/slides/slide14.xml><?xml version="1.0" encoding="utf-8"?>
+<p:sld xmlns:a="http://schemas.openxmlformats.org/drawingml/2006/main" xmlns:r="http://schemas.openxmlformats.org/officeDocument/2006/relationships" xmlns:p="http://schemas.openxmlformats.org/presentationml/2006/main">
+  <p:cSld>
+    <p:spTree>
+      <p:nvGrpSpPr>
+        <p:cNvPr id="1" name=""/>
+        <p:cNvGrpSpPr/>
+        <p:nvPr/>
+      </p:nvGrpSpPr>
+      <p:grpSpPr>
+        <a:xfrm>
+          <a:off x="0" y="0"/>
+          <a:ext cx="0" cy="0"/>
+          <a:chOff x="0" y="0"/>
+          <a:chExt cx="0" cy="0"/>
+        </a:xfrm>
+      </p:grpSpPr>
+      <p:sp>
+        <p:nvSpPr>
+          <p:cNvPr id="2" name="Titre 1"/>
+          <p:cNvSpPr>
+            <a:spLocks noGrp="1"/>
+          </p:cNvSpPr>
+          <p:nvPr>
+            <p:ph type="ctrTitle"/>
+          </p:nvPr>
+        </p:nvSpPr>
+        <p:spPr>
+          <a:xfrm>
+            <a:off x="1030224" y="384048"/>
+            <a:ext cx="9144000" cy="1287970"/>
+          </a:xfrm>
+        </p:spPr>
+        <p:txBody>
+          <a:bodyPr/>
+          <a:lstStyle/>
+          <a:p>
+            <a:r>
+              <a:rPr lang="fr-FR" dirty="0"/>
+              <a:t>Item 28</a:t>
+            </a:r>
+          </a:p>
+        </p:txBody>
+      </p:sp>
+      <p:sp>
+        <p:nvSpPr>
+          <p:cNvPr id="3" name="Sous-titre 2"/>
+          <p:cNvSpPr>
+            <a:spLocks noGrp="1"/>
+          </p:cNvSpPr>
+          <p:nvPr>
+            <p:ph type="subTitle" idx="1"/>
+          </p:nvPr>
+        </p:nvSpPr>
+        <p:spPr>
+          <a:xfrm>
+            <a:off x="1304544" y="1928686"/>
+            <a:ext cx="9144000" cy="4408106"/>
+          </a:xfrm>
+        </p:spPr>
+        <p:txBody>
+          <a:bodyPr>
+            <a:noAutofit/>
+          </a:bodyPr>
+          <a:lstStyle/>
+          <a:p>
+            <a:pPr algn="l"/>
+            <a:r>
+              <a:rPr lang="en-US" sz="2000" dirty="0"/>
+              <a:t>What is an easy way to declare arrays?</a:t>
+            </a:r>
+          </a:p>
+          <a:p>
+            <a:pPr algn="l"/>
+            <a:r>
+              <a:rPr lang="en-US" sz="2000" b="1" dirty="0">
+                <a:solidFill>
+                  <a:srgbClr val="0070C0"/>
+                </a:solidFill>
+                <a:sym typeface="Wingdings" panose="05000000000000000000" pitchFamily="2" charset="2"/>
+              </a:rPr>
+              <a:t>            Simply use:  “ private final </a:t>
+            </a:r>
+            <a:r>
+              <a:rPr lang="en-US" sz="2000" b="1" dirty="0" err="1">
+                <a:solidFill>
+                  <a:srgbClr val="0070C0"/>
+                </a:solidFill>
+                <a:sym typeface="Wingdings" panose="05000000000000000000" pitchFamily="2" charset="2"/>
+              </a:rPr>
+              <a:t>MyClass</a:t>
+            </a:r>
+            <a:r>
+              <a:rPr lang="en-US" sz="2000" b="1" dirty="0">
+                <a:solidFill>
+                  <a:srgbClr val="0070C0"/>
+                </a:solidFill>
+                <a:sym typeface="Wingdings" panose="05000000000000000000" pitchFamily="2" charset="2"/>
+              </a:rPr>
+              <a:t>[] </a:t>
+            </a:r>
+            <a:r>
+              <a:rPr lang="en-US" sz="2000" b="1" dirty="0" err="1">
+                <a:solidFill>
+                  <a:srgbClr val="0070C0"/>
+                </a:solidFill>
+                <a:sym typeface="Wingdings" panose="05000000000000000000" pitchFamily="2" charset="2"/>
+              </a:rPr>
+              <a:t>myArray</a:t>
+            </a:r>
+            <a:r>
+              <a:rPr lang="en-US" sz="2000" b="1" dirty="0">
+                <a:solidFill>
+                  <a:srgbClr val="0070C0"/>
+                </a:solidFill>
+                <a:sym typeface="Wingdings" panose="05000000000000000000" pitchFamily="2" charset="2"/>
+              </a:rPr>
+              <a:t>  = …. “</a:t>
+            </a:r>
+          </a:p>
+          <a:p>
+            <a:pPr algn="l"/>
+            <a:endParaRPr lang="en-US" sz="2000" dirty="0"/>
+          </a:p>
+          <a:p>
+            <a:pPr algn="l"/>
+            <a:r>
+              <a:rPr lang="en-US" sz="2000" dirty="0"/>
+              <a:t>But what if:</a:t>
+            </a:r>
+          </a:p>
+          <a:p>
+            <a:pPr marL="342900" indent="-342900" algn="l">
+              <a:buFont typeface="Wingdings" panose="05000000000000000000" pitchFamily="2" charset="2"/>
+              <a:buChar char="q"/>
+            </a:pPr>
+            <a:r>
+              <a:rPr lang="en-US" sz="2000" dirty="0"/>
+              <a:t>I want to guarantee my code to be safe enough (e.g. Avoid </a:t>
+            </a:r>
+            <a:r>
+              <a:rPr lang="en-US" sz="2000" dirty="0" err="1"/>
+              <a:t>ArrayStoreException</a:t>
+            </a:r>
+            <a:r>
+              <a:rPr lang="en-US" sz="2000" dirty="0"/>
+              <a:t>)?</a:t>
+            </a:r>
+          </a:p>
+          <a:p>
+            <a:pPr marL="342900" indent="-342900" algn="l">
+              <a:buFont typeface="Wingdings" panose="05000000000000000000" pitchFamily="2" charset="2"/>
+              <a:buChar char="q"/>
+            </a:pPr>
+            <a:r>
+              <a:rPr lang="en-US" sz="2000" dirty="0"/>
+              <a:t>I need to create more complex structures? </a:t>
+            </a:r>
+          </a:p>
+          <a:p>
+            <a:pPr algn="l"/>
+            <a:r>
+              <a:rPr lang="en-US" sz="2000" dirty="0"/>
+              <a:t>      e.g. complex arrays: “ </a:t>
+            </a:r>
+            <a:r>
+              <a:rPr lang="en-US" sz="2000" i="1" dirty="0"/>
+              <a:t>List&lt;? extends Number&gt; [length]</a:t>
+            </a:r>
+            <a:r>
+              <a:rPr lang="en-US" sz="2000" dirty="0"/>
+              <a:t> “</a:t>
+            </a:r>
+          </a:p>
+        </p:txBody>
+      </p:sp>
+      <p:sp>
+        <p:nvSpPr>
+          <p:cNvPr id="4" name="Rectangle 3"/>
+          <p:cNvSpPr/>
+          <p:nvPr/>
+        </p:nvSpPr>
+        <p:spPr>
+          <a:xfrm>
+            <a:off x="3426674" y="5097887"/>
+            <a:ext cx="5393528" cy="954107"/>
+          </a:xfrm>
+          <a:prstGeom prst="rect">
+            <a:avLst/>
+          </a:prstGeom>
+          <a:noFill/>
+        </p:spPr>
+        <p:txBody>
+          <a:bodyPr wrap="none" lIns="91440" tIns="45720" rIns="91440" bIns="45720">
+            <a:spAutoFit/>
+          </a:bodyPr>
+          <a:lstStyle/>
+          <a:p>
+            <a:pPr algn="ctr"/>
+            <a:r>
+              <a:rPr lang="en-US" sz="2800" b="1" dirty="0">
+                <a:ln w="22225">
+                  <a:solidFill>
+                    <a:schemeClr val="accent2"/>
+                  </a:solidFill>
+                  <a:prstDash val="solid"/>
+                </a:ln>
+                <a:solidFill>
+                  <a:schemeClr val="accent2">
+                    <a:lumMod val="40000"/>
+                    <a:lumOff val="60000"/>
+                  </a:schemeClr>
+                </a:solidFill>
+              </a:rPr>
+              <a:t>Arrays and generics don’t mix well.</a:t>
+            </a:r>
+          </a:p>
+          <a:p>
+            <a:pPr algn="ctr"/>
+            <a:r>
+              <a:rPr lang="en-US" sz="2800" b="1" dirty="0">
+                <a:ln w="22225">
+                  <a:solidFill>
+                    <a:schemeClr val="accent2"/>
+                  </a:solidFill>
+                  <a:prstDash val="solid"/>
+                </a:ln>
+                <a:solidFill>
+                  <a:schemeClr val="accent2">
+                    <a:lumMod val="40000"/>
+                    <a:lumOff val="60000"/>
+                  </a:schemeClr>
+                </a:solidFill>
+              </a:rPr>
+              <a:t>Prefer Lists over Arrays.</a:t>
+            </a:r>
+            <a:endParaRPr lang="fr-FR" sz="2800" b="1" cap="none" spc="0" dirty="0">
+              <a:ln w="22225">
+                <a:solidFill>
+                  <a:schemeClr val="accent2"/>
+                </a:solidFill>
+                <a:prstDash val="solid"/>
+              </a:ln>
+              <a:solidFill>
+                <a:schemeClr val="accent2">
+                  <a:lumMod val="40000"/>
+                  <a:lumOff val="60000"/>
+                </a:schemeClr>
+              </a:solidFill>
+              <a:effectLst/>
+            </a:endParaRPr>
+          </a:p>
+        </p:txBody>
+      </p:sp>
+    </p:spTree>
+    <p:extLst>
+      <p:ext uri="{BB962C8B-B14F-4D97-AF65-F5344CB8AC3E}">
+        <p14:creationId xmlns:p14="http://schemas.microsoft.com/office/powerpoint/2010/main" val="3345406561"/>
+      </p:ext>
+    </p:extLst>
+  </p:cSld>
+  <p:clrMapOvr>
+    <a:masterClrMapping/>
+  </p:clrMapOvr>
+  <p:timing>
+    <p:tnLst>
+      <p:par>
+        <p:cTn id="1" dur="indefinite" restart="never" nodeType="tmRoot">
+          <p:childTnLst>
+            <p:seq concurrent="1" nextAc="seek">
+              <p:cTn id="2" dur="indefinite" nodeType="mainSeq">
+                <p:childTnLst>
+                  <p:par>
+                    <p:cTn id="3" fill="hold">
+                      <p:stCondLst>
+                        <p:cond delay="indefinite"/>
+                      </p:stCondLst>
+                      <p:childTnLst>
+                        <p:par>
+                          <p:cTn id="4" fill="hold">
+                            <p:stCondLst>
+                              <p:cond delay="0"/>
+                            </p:stCondLst>
+                            <p:childTnLst>
+                              <p:par>
+                                <p:cTn id="5" presetID="1" presetClass="entr" presetSubtype="0" fill="hold" nodeType="clickEffect">
+                                  <p:stCondLst>
+                                    <p:cond delay="0"/>
+                                  </p:stCondLst>
+                                  <p:childTnLst>
+                                    <p:set>
+                                      <p:cBhvr>
+                                        <p:cTn id="6" dur="1" fill="hold">
+                                          <p:stCondLst>
+                                            <p:cond delay="0"/>
+                                          </p:stCondLst>
+                                        </p:cTn>
+                                        <p:tgtEl>
+                                          <p:spTgt spid="3">
+                                            <p:txEl>
+                                              <p:pRg st="1" end="1"/>
+                                            </p:txEl>
+                                          </p:spTgt>
+                                        </p:tgtEl>
+                                        <p:attrNameLst>
+                                          <p:attrName>style.visibility</p:attrName>
+                                        </p:attrNameLst>
+                                      </p:cBhvr>
+                                      <p:to>
+                                        <p:strVal val="visible"/>
+                                      </p:to>
+                                    </p:set>
+                                  </p:childTnLst>
+                                </p:cTn>
+                              </p:par>
+                            </p:childTnLst>
+                          </p:cTn>
+                        </p:par>
+                      </p:childTnLst>
+                    </p:cTn>
+                  </p:par>
+                  <p:par>
+                    <p:cTn id="7" fill="hold">
+                      <p:stCondLst>
+                        <p:cond delay="indefinite"/>
+                      </p:stCondLst>
+                      <p:childTnLst>
+                        <p:par>
+                          <p:cTn id="8" fill="hold">
+                            <p:stCondLst>
+                              <p:cond delay="0"/>
+                            </p:stCondLst>
+                            <p:childTnLst>
+                              <p:par>
+                                <p:cTn id="9" presetID="2" presetClass="entr" presetSubtype="4" fill="hold" nodeType="clickEffect">
+                                  <p:stCondLst>
+                                    <p:cond delay="0"/>
+                                  </p:stCondLst>
+                                  <p:childTnLst>
+                                    <p:set>
+                                      <p:cBhvr>
+                                        <p:cTn id="10" dur="1" fill="hold">
+                                          <p:stCondLst>
+                                            <p:cond delay="0"/>
+                                          </p:stCondLst>
+                                        </p:cTn>
+                                        <p:tgtEl>
+                                          <p:spTgt spid="3">
+                                            <p:txEl>
+                                              <p:pRg st="3" end="3"/>
+                                            </p:txEl>
+                                          </p:spTgt>
+                                        </p:tgtEl>
+                                        <p:attrNameLst>
+                                          <p:attrName>style.visibility</p:attrName>
+                                        </p:attrNameLst>
+                                      </p:cBhvr>
+                                      <p:to>
+                                        <p:strVal val="visible"/>
+                                      </p:to>
+                                    </p:set>
+                                    <p:anim calcmode="lin" valueType="num">
+                                      <p:cBhvr additive="base">
+                                        <p:cTn id="11" dur="500" fill="hold"/>
+                                        <p:tgtEl>
+                                          <p:spTgt spid="3">
+                                            <p:txEl>
+                                              <p:pRg st="3" end="3"/>
+                                            </p:txEl>
+                                          </p:spTgt>
+                                        </p:tgtEl>
+                                        <p:attrNameLst>
+                                          <p:attrName>ppt_x</p:attrName>
+                                        </p:attrNameLst>
+                                      </p:cBhvr>
+                                      <p:tavLst>
+                                        <p:tav tm="0">
+                                          <p:val>
+                                            <p:strVal val="#ppt_x"/>
+                                          </p:val>
+                                        </p:tav>
+                                        <p:tav tm="100000">
+                                          <p:val>
+                                            <p:strVal val="#ppt_x"/>
+                                          </p:val>
+                                        </p:tav>
+                                      </p:tavLst>
+                                    </p:anim>
+                                    <p:anim calcmode="lin" valueType="num">
+                                      <p:cBhvr additive="base">
+                                        <p:cTn id="12" dur="500" fill="hold"/>
+                                        <p:tgtEl>
+                                          <p:spTgt spid="3">
+                                            <p:txEl>
+                                              <p:pRg st="3" end="3"/>
+                                            </p:txEl>
+                                          </p:spTgt>
+                                        </p:tgtEl>
+                                        <p:attrNameLst>
+                                          <p:attrName>ppt_y</p:attrName>
+                                        </p:attrNameLst>
+                                      </p:cBhvr>
+                                      <p:tavLst>
+                                        <p:tav tm="0">
+                                          <p:val>
+                                            <p:strVal val="1+#ppt_h/2"/>
+                                          </p:val>
+                                        </p:tav>
+                                        <p:tav tm="100000">
+                                          <p:val>
+                                            <p:strVal val="#ppt_y"/>
+                                          </p:val>
+                                        </p:tav>
+                                      </p:tavLst>
+                                    </p:anim>
+                                  </p:childTnLst>
+                                </p:cTn>
+                              </p:par>
+                            </p:childTnLst>
+                          </p:cTn>
+                        </p:par>
+                      </p:childTnLst>
+                    </p:cTn>
+                  </p:par>
+                  <p:par>
+                    <p:cTn id="13" fill="hold">
+                      <p:stCondLst>
+                        <p:cond delay="indefinite"/>
+                      </p:stCondLst>
+                      <p:childTnLst>
+                        <p:par>
+                          <p:cTn id="14" fill="hold">
+                            <p:stCondLst>
+                              <p:cond delay="0"/>
+                            </p:stCondLst>
+                            <p:childTnLst>
+                              <p:par>
+                                <p:cTn id="15" presetID="2" presetClass="entr" presetSubtype="4" fill="hold" nodeType="clickEffect">
+                                  <p:stCondLst>
+                                    <p:cond delay="0"/>
+                                  </p:stCondLst>
+                                  <p:childTnLst>
+                                    <p:set>
+                                      <p:cBhvr>
+                                        <p:cTn id="16" dur="1" fill="hold">
+                                          <p:stCondLst>
+                                            <p:cond delay="0"/>
+                                          </p:stCondLst>
+                                        </p:cTn>
+                                        <p:tgtEl>
+                                          <p:spTgt spid="3">
+                                            <p:txEl>
+                                              <p:pRg st="4" end="4"/>
+                                            </p:txEl>
+                                          </p:spTgt>
+                                        </p:tgtEl>
+                                        <p:attrNameLst>
+                                          <p:attrName>style.visibility</p:attrName>
+                                        </p:attrNameLst>
+                                      </p:cBhvr>
+                                      <p:to>
+                                        <p:strVal val="visible"/>
+                                      </p:to>
+                                    </p:set>
+                                    <p:anim calcmode="lin" valueType="num">
+                                      <p:cBhvr additive="base">
+                                        <p:cTn id="17" dur="500" fill="hold"/>
+                                        <p:tgtEl>
+                                          <p:spTgt spid="3">
+                                            <p:txEl>
+                                              <p:pRg st="4" end="4"/>
+                                            </p:txEl>
+                                          </p:spTgt>
+                                        </p:tgtEl>
+                                        <p:attrNameLst>
+                                          <p:attrName>ppt_x</p:attrName>
+                                        </p:attrNameLst>
+                                      </p:cBhvr>
+                                      <p:tavLst>
+                                        <p:tav tm="0">
+                                          <p:val>
+                                            <p:strVal val="#ppt_x"/>
+                                          </p:val>
+                                        </p:tav>
+                                        <p:tav tm="100000">
+                                          <p:val>
+                                            <p:strVal val="#ppt_x"/>
+                                          </p:val>
+                                        </p:tav>
+                                      </p:tavLst>
+                                    </p:anim>
+                                    <p:anim calcmode="lin" valueType="num">
+                                      <p:cBhvr additive="base">
+                                        <p:cTn id="18" dur="500" fill="hold"/>
+                                        <p:tgtEl>
+                                          <p:spTgt spid="3">
+                                            <p:txEl>
+                                              <p:pRg st="4" end="4"/>
+                                            </p:txEl>
+                                          </p:spTgt>
+                                        </p:tgtEl>
+                                        <p:attrNameLst>
+                                          <p:attrName>ppt_y</p:attrName>
+                                        </p:attrNameLst>
+                                      </p:cBhvr>
+                                      <p:tavLst>
+                                        <p:tav tm="0">
+                                          <p:val>
+                                            <p:strVal val="1+#ppt_h/2"/>
+                                          </p:val>
+                                        </p:tav>
+                                        <p:tav tm="100000">
+                                          <p:val>
+                                            <p:strVal val="#ppt_y"/>
+                                          </p:val>
+                                        </p:tav>
+                                      </p:tavLst>
+                                    </p:anim>
+                                  </p:childTnLst>
+                                </p:cTn>
+                              </p:par>
+                              <p:par>
+                                <p:cTn id="19" presetID="2" presetClass="entr" presetSubtype="4" fill="hold" nodeType="withEffect">
+                                  <p:stCondLst>
+                                    <p:cond delay="0"/>
+                                  </p:stCondLst>
+                                  <p:childTnLst>
+                                    <p:set>
+                                      <p:cBhvr>
+                                        <p:cTn id="20" dur="1" fill="hold">
+                                          <p:stCondLst>
+                                            <p:cond delay="0"/>
+                                          </p:stCondLst>
+                                        </p:cTn>
+                                        <p:tgtEl>
+                                          <p:spTgt spid="3">
+                                            <p:txEl>
+                                              <p:pRg st="5" end="5"/>
+                                            </p:txEl>
+                                          </p:spTgt>
+                                        </p:tgtEl>
+                                        <p:attrNameLst>
+                                          <p:attrName>style.visibility</p:attrName>
+                                        </p:attrNameLst>
+                                      </p:cBhvr>
+                                      <p:to>
+                                        <p:strVal val="visible"/>
+                                      </p:to>
+                                    </p:set>
+                                    <p:anim calcmode="lin" valueType="num">
+                                      <p:cBhvr additive="base">
+                                        <p:cTn id="21" dur="500" fill="hold"/>
+                                        <p:tgtEl>
+                                          <p:spTgt spid="3">
+                                            <p:txEl>
+                                              <p:pRg st="5" end="5"/>
+                                            </p:txEl>
+                                          </p:spTgt>
+                                        </p:tgtEl>
+                                        <p:attrNameLst>
+                                          <p:attrName>ppt_x</p:attrName>
+                                        </p:attrNameLst>
+                                      </p:cBhvr>
+                                      <p:tavLst>
+                                        <p:tav tm="0">
+                                          <p:val>
+                                            <p:strVal val="#ppt_x"/>
+                                          </p:val>
+                                        </p:tav>
+                                        <p:tav tm="100000">
+                                          <p:val>
+                                            <p:strVal val="#ppt_x"/>
+                                          </p:val>
+                                        </p:tav>
+                                      </p:tavLst>
+                                    </p:anim>
+                                    <p:anim calcmode="lin" valueType="num">
+                                      <p:cBhvr additive="base">
+                                        <p:cTn id="22" dur="500" fill="hold"/>
+                                        <p:tgtEl>
+                                          <p:spTgt spid="3">
+                                            <p:txEl>
+                                              <p:pRg st="5" end="5"/>
+                                            </p:txEl>
+                                          </p:spTgt>
+                                        </p:tgtEl>
+                                        <p:attrNameLst>
+                                          <p:attrName>ppt_y</p:attrName>
+                                        </p:attrNameLst>
+                                      </p:cBhvr>
+                                      <p:tavLst>
+                                        <p:tav tm="0">
+                                          <p:val>
+                                            <p:strVal val="1+#ppt_h/2"/>
+                                          </p:val>
+                                        </p:tav>
+                                        <p:tav tm="100000">
+                                          <p:val>
+                                            <p:strVal val="#ppt_y"/>
+                                          </p:val>
+                                        </p:tav>
+                                      </p:tavLst>
+                                    </p:anim>
+                                  </p:childTnLst>
+                                </p:cTn>
+                              </p:par>
+                              <p:par>
+                                <p:cTn id="23" presetID="2" presetClass="entr" presetSubtype="4" fill="hold" nodeType="withEffect">
+                                  <p:stCondLst>
+                                    <p:cond delay="0"/>
+                                  </p:stCondLst>
+                                  <p:childTnLst>
+                                    <p:set>
+                                      <p:cBhvr>
+                                        <p:cTn id="24" dur="1" fill="hold">
+                                          <p:stCondLst>
+                                            <p:cond delay="0"/>
+                                          </p:stCondLst>
+                                        </p:cTn>
+                                        <p:tgtEl>
+                                          <p:spTgt spid="3">
+                                            <p:txEl>
+                                              <p:pRg st="6" end="6"/>
+                                            </p:txEl>
+                                          </p:spTgt>
+                                        </p:tgtEl>
+                                        <p:attrNameLst>
+                                          <p:attrName>style.visibility</p:attrName>
+                                        </p:attrNameLst>
+                                      </p:cBhvr>
+                                      <p:to>
+                                        <p:strVal val="visible"/>
+                                      </p:to>
+                                    </p:set>
+                                    <p:anim calcmode="lin" valueType="num">
+                                      <p:cBhvr additive="base">
+                                        <p:cTn id="25" dur="500" fill="hold"/>
+                                        <p:tgtEl>
+                                          <p:spTgt spid="3">
+                                            <p:txEl>
+                                              <p:pRg st="6" end="6"/>
+                                            </p:txEl>
+                                          </p:spTgt>
+                                        </p:tgtEl>
+                                        <p:attrNameLst>
+                                          <p:attrName>ppt_x</p:attrName>
+                                        </p:attrNameLst>
+                                      </p:cBhvr>
+                                      <p:tavLst>
+                                        <p:tav tm="0">
+                                          <p:val>
+                                            <p:strVal val="#ppt_x"/>
+                                          </p:val>
+                                        </p:tav>
+                                        <p:tav tm="100000">
+                                          <p:val>
+                                            <p:strVal val="#ppt_x"/>
+                                          </p:val>
+                                        </p:tav>
+                                      </p:tavLst>
+                                    </p:anim>
+                                    <p:anim calcmode="lin" valueType="num">
+                                      <p:cBhvr additive="base">
+                                        <p:cTn id="26" dur="500" fill="hold"/>
+                                        <p:tgtEl>
+                                          <p:spTgt spid="3">
+                                            <p:txEl>
+                                              <p:pRg st="6" end="6"/>
+                                            </p:txEl>
+                                          </p:spTgt>
+                                        </p:tgtEl>
+                                        <p:attrNameLst>
+                                          <p:attrName>ppt_y</p:attrName>
+                                        </p:attrNameLst>
+                                      </p:cBhvr>
+                                      <p:tavLst>
+                                        <p:tav tm="0">
+                                          <p:val>
+                                            <p:strVal val="1+#ppt_h/2"/>
+                                          </p:val>
+                                        </p:tav>
+                                        <p:tav tm="100000">
+                                          <p:val>
+                                            <p:strVal val="#ppt_y"/>
+                                          </p:val>
+                                        </p:tav>
+                                      </p:tavLst>
+                                    </p:anim>
+                                  </p:childTnLst>
+                                </p:cTn>
+                              </p:par>
+                            </p:childTnLst>
+                          </p:cTn>
+                        </p:par>
+                      </p:childTnLst>
+                    </p:cTn>
+                  </p:par>
+                  <p:par>
+                    <p:cTn id="27" fill="hold">
+                      <p:stCondLst>
+                        <p:cond delay="indefinite"/>
+                      </p:stCondLst>
+                      <p:childTnLst>
+                        <p:par>
+                          <p:cTn id="28" fill="hold">
+                            <p:stCondLst>
+                              <p:cond delay="0"/>
+                            </p:stCondLst>
+                            <p:childTnLst>
+                              <p:par>
+                                <p:cTn id="29" presetID="53" presetClass="entr" presetSubtype="16" fill="hold" grpId="0" nodeType="clickEffect">
+                                  <p:stCondLst>
+                                    <p:cond delay="0"/>
+                                  </p:stCondLst>
+                                  <p:childTnLst>
+                                    <p:set>
+                                      <p:cBhvr>
+                                        <p:cTn id="30" dur="1" fill="hold">
+                                          <p:stCondLst>
+                                            <p:cond delay="0"/>
+                                          </p:stCondLst>
+                                        </p:cTn>
+                                        <p:tgtEl>
+                                          <p:spTgt spid="4"/>
+                                        </p:tgtEl>
+                                        <p:attrNameLst>
+                                          <p:attrName>style.visibility</p:attrName>
+                                        </p:attrNameLst>
+                                      </p:cBhvr>
+                                      <p:to>
+                                        <p:strVal val="visible"/>
+                                      </p:to>
+                                    </p:set>
+                                    <p:anim calcmode="lin" valueType="num">
+                                      <p:cBhvr>
+                                        <p:cTn id="31" dur="500" fill="hold"/>
+                                        <p:tgtEl>
+                                          <p:spTgt spid="4"/>
+                                        </p:tgtEl>
+                                        <p:attrNameLst>
+                                          <p:attrName>ppt_w</p:attrName>
+                                        </p:attrNameLst>
+                                      </p:cBhvr>
+                                      <p:tavLst>
+                                        <p:tav tm="0">
+                                          <p:val>
+                                            <p:fltVal val="0"/>
+                                          </p:val>
+                                        </p:tav>
+                                        <p:tav tm="100000">
+                                          <p:val>
+                                            <p:strVal val="#ppt_w"/>
+                                          </p:val>
+                                        </p:tav>
+                                      </p:tavLst>
+                                    </p:anim>
+                                    <p:anim calcmode="lin" valueType="num">
+                                      <p:cBhvr>
+                                        <p:cTn id="32" dur="500" fill="hold"/>
+                                        <p:tgtEl>
+                                          <p:spTgt spid="4"/>
+                                        </p:tgtEl>
+                                        <p:attrNameLst>
+                                          <p:attrName>ppt_h</p:attrName>
+                                        </p:attrNameLst>
+                                      </p:cBhvr>
+                                      <p:tavLst>
+                                        <p:tav tm="0">
+                                          <p:val>
+                                            <p:fltVal val="0"/>
+                                          </p:val>
+                                        </p:tav>
+                                        <p:tav tm="100000">
+                                          <p:val>
+                                            <p:strVal val="#ppt_h"/>
+                                          </p:val>
+                                        </p:tav>
+                                      </p:tavLst>
+                                    </p:anim>
+                                    <p:animEffect transition="in" filter="fade">
+                                      <p:cBhvr>
+                                        <p:cTn id="33" dur="500"/>
+                                        <p:tgtEl>
+                                          <p:spTgt spid="4"/>
+                                        </p:tgtEl>
+                                      </p:cBhvr>
+                                    </p:animEffect>
+                                  </p:childTnLst>
+                                </p:cTn>
+                              </p:par>
+                            </p:childTnLst>
+                          </p:cTn>
+                        </p:par>
+                      </p:childTnLst>
+                    </p:cTn>
+                  </p:par>
+                </p:childTnLst>
+              </p:cTn>
+              <p:prevCondLst>
+                <p:cond evt="onPrev" delay="0">
+                  <p:tgtEl>
+                    <p:sldTgt/>
+                  </p:tgtEl>
+                </p:cond>
+              </p:prevCondLst>
+              <p:nextCondLst>
+                <p:cond evt="onNext" delay="0">
+                  <p:tgtEl>
+                    <p:sldTgt/>
+                  </p:tgtEl>
+                </p:cond>
+              </p:nextCondLst>
+            </p:seq>
+          </p:childTnLst>
+        </p:cTn>
+      </p:par>
+    </p:tnLst>
+    <p:bldLst>
+      <p:bldP spid="4" grpId="0"/>
+    </p:bldLst>
+  </p:timing>
+</p:sld>
+</file>
+
 <file path=ppt/slides/slide2.xml><?xml version="1.0" encoding="utf-8"?>
 <p:sld xmlns:a="http://schemas.openxmlformats.org/drawingml/2006/main" xmlns:r="http://schemas.openxmlformats.org/officeDocument/2006/relationships" xmlns:p="http://schemas.openxmlformats.org/presentationml/2006/main">
   <p:cSld>

</xml_diff>

<commit_message>
Fix typo in item 26
</commit_message>
<xml_diff>
--- a/effective-java.pptx
+++ b/effective-java.pptx
@@ -254,7 +254,7 @@
           <a:p>
             <a:fld id="{755BA608-1639-41EA-B572-74EA19863A33}" type="datetimeFigureOut">
               <a:rPr lang="fr-FR" smtClean="0"/>
-              <a:t>19/09/2019</a:t>
+              <a:t>20/11/2019</a:t>
             </a:fld>
             <a:endParaRPr lang="fr-FR"/>
           </a:p>
@@ -296,7 +296,7 @@
           <a:p>
             <a:fld id="{6DABBBE8-4F33-445F-BAB7-1C9BE9D4933C}" type="slidenum">
               <a:rPr lang="fr-FR" smtClean="0"/>
-              <a:t>‹#›</a:t>
+              <a:t>‹N°›</a:t>
             </a:fld>
             <a:endParaRPr lang="fr-FR"/>
           </a:p>
@@ -422,7 +422,7 @@
           <a:p>
             <a:fld id="{755BA608-1639-41EA-B572-74EA19863A33}" type="datetimeFigureOut">
               <a:rPr lang="fr-FR" smtClean="0"/>
-              <a:t>19/09/2019</a:t>
+              <a:t>20/11/2019</a:t>
             </a:fld>
             <a:endParaRPr lang="fr-FR"/>
           </a:p>
@@ -464,7 +464,7 @@
           <a:p>
             <a:fld id="{6DABBBE8-4F33-445F-BAB7-1C9BE9D4933C}" type="slidenum">
               <a:rPr lang="fr-FR" smtClean="0"/>
-              <a:t>‹#›</a:t>
+              <a:t>‹N°›</a:t>
             </a:fld>
             <a:endParaRPr lang="fr-FR"/>
           </a:p>
@@ -600,7 +600,7 @@
           <a:p>
             <a:fld id="{755BA608-1639-41EA-B572-74EA19863A33}" type="datetimeFigureOut">
               <a:rPr lang="fr-FR" smtClean="0"/>
-              <a:t>19/09/2019</a:t>
+              <a:t>20/11/2019</a:t>
             </a:fld>
             <a:endParaRPr lang="fr-FR"/>
           </a:p>
@@ -642,7 +642,7 @@
           <a:p>
             <a:fld id="{6DABBBE8-4F33-445F-BAB7-1C9BE9D4933C}" type="slidenum">
               <a:rPr lang="fr-FR" smtClean="0"/>
-              <a:t>‹#›</a:t>
+              <a:t>‹N°›</a:t>
             </a:fld>
             <a:endParaRPr lang="fr-FR"/>
           </a:p>
@@ -768,7 +768,7 @@
           <a:p>
             <a:fld id="{755BA608-1639-41EA-B572-74EA19863A33}" type="datetimeFigureOut">
               <a:rPr lang="fr-FR" smtClean="0"/>
-              <a:t>19/09/2019</a:t>
+              <a:t>20/11/2019</a:t>
             </a:fld>
             <a:endParaRPr lang="fr-FR"/>
           </a:p>
@@ -810,7 +810,7 @@
           <a:p>
             <a:fld id="{6DABBBE8-4F33-445F-BAB7-1C9BE9D4933C}" type="slidenum">
               <a:rPr lang="fr-FR" smtClean="0"/>
-              <a:t>‹#›</a:t>
+              <a:t>‹N°›</a:t>
             </a:fld>
             <a:endParaRPr lang="fr-FR"/>
           </a:p>
@@ -1013,7 +1013,7 @@
           <a:p>
             <a:fld id="{755BA608-1639-41EA-B572-74EA19863A33}" type="datetimeFigureOut">
               <a:rPr lang="fr-FR" smtClean="0"/>
-              <a:t>19/09/2019</a:t>
+              <a:t>20/11/2019</a:t>
             </a:fld>
             <a:endParaRPr lang="fr-FR"/>
           </a:p>
@@ -1055,7 +1055,7 @@
           <a:p>
             <a:fld id="{6DABBBE8-4F33-445F-BAB7-1C9BE9D4933C}" type="slidenum">
               <a:rPr lang="fr-FR" smtClean="0"/>
-              <a:t>‹#›</a:t>
+              <a:t>‹N°›</a:t>
             </a:fld>
             <a:endParaRPr lang="fr-FR"/>
           </a:p>
@@ -1242,7 +1242,7 @@
           <a:p>
             <a:fld id="{755BA608-1639-41EA-B572-74EA19863A33}" type="datetimeFigureOut">
               <a:rPr lang="fr-FR" smtClean="0"/>
-              <a:t>19/09/2019</a:t>
+              <a:t>20/11/2019</a:t>
             </a:fld>
             <a:endParaRPr lang="fr-FR"/>
           </a:p>
@@ -1284,7 +1284,7 @@
           <a:p>
             <a:fld id="{6DABBBE8-4F33-445F-BAB7-1C9BE9D4933C}" type="slidenum">
               <a:rPr lang="fr-FR" smtClean="0"/>
-              <a:t>‹#›</a:t>
+              <a:t>‹N°›</a:t>
             </a:fld>
             <a:endParaRPr lang="fr-FR"/>
           </a:p>
@@ -1606,7 +1606,7 @@
           <a:p>
             <a:fld id="{755BA608-1639-41EA-B572-74EA19863A33}" type="datetimeFigureOut">
               <a:rPr lang="fr-FR" smtClean="0"/>
-              <a:t>19/09/2019</a:t>
+              <a:t>20/11/2019</a:t>
             </a:fld>
             <a:endParaRPr lang="fr-FR"/>
           </a:p>
@@ -1648,7 +1648,7 @@
           <a:p>
             <a:fld id="{6DABBBE8-4F33-445F-BAB7-1C9BE9D4933C}" type="slidenum">
               <a:rPr lang="fr-FR" smtClean="0"/>
-              <a:t>‹#›</a:t>
+              <a:t>‹N°›</a:t>
             </a:fld>
             <a:endParaRPr lang="fr-FR"/>
           </a:p>
@@ -1723,7 +1723,7 @@
           <a:p>
             <a:fld id="{755BA608-1639-41EA-B572-74EA19863A33}" type="datetimeFigureOut">
               <a:rPr lang="fr-FR" smtClean="0"/>
-              <a:t>19/09/2019</a:t>
+              <a:t>20/11/2019</a:t>
             </a:fld>
             <a:endParaRPr lang="fr-FR"/>
           </a:p>
@@ -1765,7 +1765,7 @@
           <a:p>
             <a:fld id="{6DABBBE8-4F33-445F-BAB7-1C9BE9D4933C}" type="slidenum">
               <a:rPr lang="fr-FR" smtClean="0"/>
-              <a:t>‹#›</a:t>
+              <a:t>‹N°›</a:t>
             </a:fld>
             <a:endParaRPr lang="fr-FR"/>
           </a:p>
@@ -1818,7 +1818,7 @@
           <a:p>
             <a:fld id="{755BA608-1639-41EA-B572-74EA19863A33}" type="datetimeFigureOut">
               <a:rPr lang="fr-FR" smtClean="0"/>
-              <a:t>19/09/2019</a:t>
+              <a:t>20/11/2019</a:t>
             </a:fld>
             <a:endParaRPr lang="fr-FR"/>
           </a:p>
@@ -1860,7 +1860,7 @@
           <a:p>
             <a:fld id="{6DABBBE8-4F33-445F-BAB7-1C9BE9D4933C}" type="slidenum">
               <a:rPr lang="fr-FR" smtClean="0"/>
-              <a:t>‹#›</a:t>
+              <a:t>‹N°›</a:t>
             </a:fld>
             <a:endParaRPr lang="fr-FR"/>
           </a:p>
@@ -2093,7 +2093,7 @@
           <a:p>
             <a:fld id="{755BA608-1639-41EA-B572-74EA19863A33}" type="datetimeFigureOut">
               <a:rPr lang="fr-FR" smtClean="0"/>
-              <a:t>19/09/2019</a:t>
+              <a:t>20/11/2019</a:t>
             </a:fld>
             <a:endParaRPr lang="fr-FR"/>
           </a:p>
@@ -2135,7 +2135,7 @@
           <a:p>
             <a:fld id="{6DABBBE8-4F33-445F-BAB7-1C9BE9D4933C}" type="slidenum">
               <a:rPr lang="fr-FR" smtClean="0"/>
-              <a:t>‹#›</a:t>
+              <a:t>‹N°›</a:t>
             </a:fld>
             <a:endParaRPr lang="fr-FR"/>
           </a:p>
@@ -2345,7 +2345,7 @@
           <a:p>
             <a:fld id="{755BA608-1639-41EA-B572-74EA19863A33}" type="datetimeFigureOut">
               <a:rPr lang="fr-FR" smtClean="0"/>
-              <a:t>19/09/2019</a:t>
+              <a:t>20/11/2019</a:t>
             </a:fld>
             <a:endParaRPr lang="fr-FR"/>
           </a:p>
@@ -2387,7 +2387,7 @@
           <a:p>
             <a:fld id="{6DABBBE8-4F33-445F-BAB7-1C9BE9D4933C}" type="slidenum">
               <a:rPr lang="fr-FR" smtClean="0"/>
-              <a:t>‹#›</a:t>
+              <a:t>‹N°›</a:t>
             </a:fld>
             <a:endParaRPr lang="fr-FR"/>
           </a:p>
@@ -2556,7 +2556,7 @@
           <a:p>
             <a:fld id="{755BA608-1639-41EA-B572-74EA19863A33}" type="datetimeFigureOut">
               <a:rPr lang="fr-FR" smtClean="0"/>
-              <a:t>19/09/2019</a:t>
+              <a:t>20/11/2019</a:t>
             </a:fld>
             <a:endParaRPr lang="fr-FR"/>
           </a:p>
@@ -2634,7 +2634,7 @@
           <a:p>
             <a:fld id="{6DABBBE8-4F33-445F-BAB7-1C9BE9D4933C}" type="slidenum">
               <a:rPr lang="fr-FR" smtClean="0"/>
-              <a:t>‹#›</a:t>
+              <a:t>‹N°›</a:t>
             </a:fld>
             <a:endParaRPr lang="fr-FR"/>
           </a:p>
@@ -5132,7 +5132,7 @@
             </a:pPr>
             <a:r>
               <a:rPr lang="en-US" sz="2000" dirty="0"/>
-              <a:t>I want to avoid casting very object I read from the collection?</a:t>
+              <a:t>I want to avoid casting every object I read from the collection?</a:t>
             </a:r>
           </a:p>
           <a:p>

</xml_diff>

<commit_message>
Item 10: restructure code snippets
</commit_message>
<xml_diff>
--- a/effective-java.pptx
+++ b/effective-java.pptx
@@ -15,10 +15,13 @@
     <p:sldId id="260" r:id="rId9"/>
     <p:sldId id="261" r:id="rId10"/>
     <p:sldId id="262" r:id="rId11"/>
-    <p:sldId id="263" r:id="rId12"/>
-    <p:sldId id="267" r:id="rId13"/>
-    <p:sldId id="268" r:id="rId14"/>
-    <p:sldId id="269" r:id="rId15"/>
+    <p:sldId id="270" r:id="rId12"/>
+    <p:sldId id="271" r:id="rId13"/>
+    <p:sldId id="272" r:id="rId14"/>
+    <p:sldId id="263" r:id="rId15"/>
+    <p:sldId id="267" r:id="rId16"/>
+    <p:sldId id="268" r:id="rId17"/>
+    <p:sldId id="269" r:id="rId18"/>
   </p:sldIdLst>
   <p:sldSz cx="12192000" cy="6858000"/>
   <p:notesSz cx="6858000" cy="9144000"/>
@@ -3670,6 +3673,485 @@
 <file path=ppt/slides/slide11.xml><?xml version="1.0" encoding="utf-8"?>
 <p:sld xmlns:a="http://schemas.openxmlformats.org/drawingml/2006/main" xmlns:r="http://schemas.openxmlformats.org/officeDocument/2006/relationships" xmlns:p="http://schemas.openxmlformats.org/presentationml/2006/main">
   <p:cSld>
+    <p:bg>
+      <p:bgPr>
+        <a:solidFill>
+          <a:schemeClr val="bg1"/>
+        </a:solidFill>
+        <a:effectLst/>
+      </p:bgPr>
+    </p:bg>
+    <p:spTree>
+      <p:nvGrpSpPr>
+        <p:cNvPr id="1" name=""/>
+        <p:cNvGrpSpPr/>
+        <p:nvPr/>
+      </p:nvGrpSpPr>
+      <p:grpSpPr>
+        <a:xfrm>
+          <a:off x="0" y="0"/>
+          <a:ext cx="0" cy="0"/>
+          <a:chOff x="0" y="0"/>
+          <a:chExt cx="0" cy="0"/>
+        </a:xfrm>
+      </p:grpSpPr>
+      <p:sp>
+        <p:nvSpPr>
+          <p:cNvPr id="21" name="Rectangle 14">
+            <a:extLst>
+              <a:ext uri="{FF2B5EF4-FFF2-40B4-BE49-F238E27FC236}">
+                <a16:creationId xmlns:a16="http://schemas.microsoft.com/office/drawing/2014/main" id="{32BC26D8-82FB-445E-AA49-62A77D7C1EE0}"/>
+              </a:ext>
+              <a:ext uri="{C183D7F6-B498-43B3-948B-1728B52AA6E4}">
+                <adec:decorative xmlns:adec="http://schemas.microsoft.com/office/drawing/2017/decorative" val="1"/>
+              </a:ext>
+            </a:extLst>
+          </p:cNvPr>
+          <p:cNvSpPr>
+            <a:spLocks noGrp="1" noRot="1" noChangeAspect="1" noMove="1" noResize="1" noEditPoints="1" noAdjustHandles="1" noChangeArrowheads="1" noChangeShapeType="1" noTextEdit="1"/>
+          </p:cNvSpPr>
+          <p:nvPr>
+            <p:extLst>
+              <p:ext uri="{386F3935-93C4-4BCD-93E2-E3B085C9AB24}">
+                <p16:designElem xmlns:p16="http://schemas.microsoft.com/office/powerpoint/2015/main" val="1"/>
+              </p:ext>
+            </p:extLst>
+          </p:nvPr>
+        </p:nvSpPr>
+        <p:spPr>
+          <a:xfrm>
+            <a:off x="0" y="0"/>
+            <a:ext cx="12192000" cy="6858000"/>
+          </a:xfrm>
+          <a:prstGeom prst="rect">
+            <a:avLst/>
+          </a:prstGeom>
+          <a:solidFill>
+            <a:srgbClr val="434671"/>
+          </a:solidFill>
+          <a:ln>
+            <a:noFill/>
+          </a:ln>
+        </p:spPr>
+        <p:style>
+          <a:lnRef idx="2">
+            <a:schemeClr val="accent1">
+              <a:shade val="50000"/>
+            </a:schemeClr>
+          </a:lnRef>
+          <a:fillRef idx="1">
+            <a:schemeClr val="accent1"/>
+          </a:fillRef>
+          <a:effectRef idx="0">
+            <a:schemeClr val="accent1"/>
+          </a:effectRef>
+          <a:fontRef idx="minor">
+            <a:schemeClr val="lt1"/>
+          </a:fontRef>
+        </p:style>
+        <p:txBody>
+          <a:bodyPr rtlCol="0" anchor="ctr"/>
+          <a:lstStyle/>
+          <a:p>
+            <a:pPr algn="ctr"/>
+            <a:endParaRPr lang="en-US"/>
+          </a:p>
+        </p:txBody>
+      </p:sp>
+      <p:sp>
+        <p:nvSpPr>
+          <p:cNvPr id="22" name="Rectangle 16">
+            <a:extLst>
+              <a:ext uri="{FF2B5EF4-FFF2-40B4-BE49-F238E27FC236}">
+                <a16:creationId xmlns:a16="http://schemas.microsoft.com/office/drawing/2014/main" id="{CB44330D-EA18-4254-AA95-EB49948539B8}"/>
+              </a:ext>
+              <a:ext uri="{C183D7F6-B498-43B3-948B-1728B52AA6E4}">
+                <adec:decorative xmlns:adec="http://schemas.microsoft.com/office/drawing/2017/decorative" val="1"/>
+              </a:ext>
+            </a:extLst>
+          </p:cNvPr>
+          <p:cNvSpPr>
+            <a:spLocks noGrp="1" noRot="1" noChangeAspect="1" noMove="1" noResize="1" noEditPoints="1" noAdjustHandles="1" noChangeArrowheads="1" noChangeShapeType="1" noTextEdit="1"/>
+          </p:cNvSpPr>
+          <p:nvPr>
+            <p:extLst>
+              <p:ext uri="{386F3935-93C4-4BCD-93E2-E3B085C9AB24}">
+                <p16:designElem xmlns:p16="http://schemas.microsoft.com/office/powerpoint/2015/main" val="1"/>
+              </p:ext>
+            </p:extLst>
+          </p:nvPr>
+        </p:nvSpPr>
+        <p:spPr>
+          <a:xfrm>
+            <a:off x="477012" y="480060"/>
+            <a:ext cx="11237976" cy="5897880"/>
+          </a:xfrm>
+          <a:prstGeom prst="rect">
+            <a:avLst/>
+          </a:prstGeom>
+          <a:solidFill>
+            <a:srgbClr val="FFFFFF"/>
+          </a:solidFill>
+          <a:ln>
+            <a:noFill/>
+          </a:ln>
+        </p:spPr>
+        <p:style>
+          <a:lnRef idx="2">
+            <a:schemeClr val="accent1">
+              <a:shade val="50000"/>
+            </a:schemeClr>
+          </a:lnRef>
+          <a:fillRef idx="1">
+            <a:schemeClr val="accent1"/>
+          </a:fillRef>
+          <a:effectRef idx="0">
+            <a:schemeClr val="accent1"/>
+          </a:effectRef>
+          <a:fontRef idx="minor">
+            <a:schemeClr val="lt1"/>
+          </a:fontRef>
+        </p:style>
+        <p:txBody>
+          <a:bodyPr rtlCol="0" anchor="ctr"/>
+          <a:lstStyle/>
+          <a:p>
+            <a:pPr algn="ctr"/>
+            <a:endParaRPr lang="en-US"/>
+          </a:p>
+        </p:txBody>
+      </p:sp>
+      <p:pic>
+        <p:nvPicPr>
+          <p:cNvPr id="10" name="Image 9">
+            <a:extLst>
+              <a:ext uri="{FF2B5EF4-FFF2-40B4-BE49-F238E27FC236}">
+                <a16:creationId xmlns:a16="http://schemas.microsoft.com/office/drawing/2014/main" id="{33793C68-925E-4776-A78E-661673AA91AE}"/>
+              </a:ext>
+            </a:extLst>
+          </p:cNvPr>
+          <p:cNvPicPr>
+            <a:picLocks noChangeAspect="1"/>
+          </p:cNvPicPr>
+          <p:nvPr/>
+        </p:nvPicPr>
+        <p:blipFill>
+          <a:blip r:embed="rId2">
+            <a:extLst>
+              <a:ext uri="{28A0092B-C50C-407E-A947-70E740481C1C}">
+                <a14:useLocalDpi xmlns:a14="http://schemas.microsoft.com/office/drawing/2010/main" val="0"/>
+              </a:ext>
+            </a:extLst>
+          </a:blip>
+          <a:stretch>
+            <a:fillRect/>
+          </a:stretch>
+        </p:blipFill>
+        <p:spPr>
+          <a:xfrm>
+            <a:off x="3839718" y="643467"/>
+            <a:ext cx="4512563" cy="5571066"/>
+          </a:xfrm>
+          <a:prstGeom prst="rect">
+            <a:avLst/>
+          </a:prstGeom>
+        </p:spPr>
+      </p:pic>
+    </p:spTree>
+    <p:extLst>
+      <p:ext uri="{BB962C8B-B14F-4D97-AF65-F5344CB8AC3E}">
+        <p14:creationId xmlns:p14="http://schemas.microsoft.com/office/powerpoint/2010/main" val="2055826317"/>
+      </p:ext>
+    </p:extLst>
+  </p:cSld>
+  <p:clrMapOvr>
+    <a:masterClrMapping/>
+  </p:clrMapOvr>
+</p:sld>
+</file>
+
+<file path=ppt/slides/slide12.xml><?xml version="1.0" encoding="utf-8"?>
+<p:sld xmlns:a="http://schemas.openxmlformats.org/drawingml/2006/main" xmlns:r="http://schemas.openxmlformats.org/officeDocument/2006/relationships" xmlns:p="http://schemas.openxmlformats.org/presentationml/2006/main">
+  <p:cSld>
+    <p:spTree>
+      <p:nvGrpSpPr>
+        <p:cNvPr id="1" name=""/>
+        <p:cNvGrpSpPr/>
+        <p:nvPr/>
+      </p:nvGrpSpPr>
+      <p:grpSpPr>
+        <a:xfrm>
+          <a:off x="0" y="0"/>
+          <a:ext cx="0" cy="0"/>
+          <a:chOff x="0" y="0"/>
+          <a:chExt cx="0" cy="0"/>
+        </a:xfrm>
+      </p:grpSpPr>
+      <p:sp>
+        <p:nvSpPr>
+          <p:cNvPr id="11" name="ZoneTexte 10">
+            <a:extLst>
+              <a:ext uri="{FF2B5EF4-FFF2-40B4-BE49-F238E27FC236}">
+                <a16:creationId xmlns:a16="http://schemas.microsoft.com/office/drawing/2014/main" id="{E9C7D0EF-FF34-4180-8EF3-5F1B294CC527}"/>
+              </a:ext>
+            </a:extLst>
+          </p:cNvPr>
+          <p:cNvSpPr txBox="1"/>
+          <p:nvPr/>
+        </p:nvSpPr>
+        <p:spPr>
+          <a:xfrm>
+            <a:off x="150830" y="645735"/>
+            <a:ext cx="11849492" cy="2123658"/>
+          </a:xfrm>
+          <a:prstGeom prst="rect">
+            <a:avLst/>
+          </a:prstGeom>
+          <a:noFill/>
+        </p:spPr>
+        <p:txBody>
+          <a:bodyPr wrap="square" rtlCol="0">
+            <a:spAutoFit/>
+          </a:bodyPr>
+          <a:lstStyle/>
+          <a:p>
+            <a:r>
+              <a:rPr lang="en-US" sz="6000" dirty="0">
+                <a:latin typeface="+mj-lt"/>
+                <a:ea typeface="+mj-ea"/>
+                <a:cs typeface="+mj-cs"/>
+              </a:rPr>
+              <a:t>Case</a:t>
+            </a:r>
+            <a:r>
+              <a:rPr lang="en-US" dirty="0"/>
+              <a:t> </a:t>
+            </a:r>
+            <a:r>
+              <a:rPr lang="en-US" sz="6000" dirty="0">
+                <a:latin typeface="+mj-lt"/>
+                <a:ea typeface="+mj-ea"/>
+                <a:cs typeface="+mj-cs"/>
+              </a:rPr>
+              <a:t>Study:</a:t>
+            </a:r>
+            <a:br>
+              <a:rPr lang="en-US" sz="6000" dirty="0">
+                <a:latin typeface="+mj-lt"/>
+                <a:ea typeface="+mj-ea"/>
+                <a:cs typeface="+mj-cs"/>
+              </a:rPr>
+            </a:br>
+            <a:r>
+              <a:rPr lang="en-US" sz="5400" dirty="0">
+                <a:latin typeface="+mj-lt"/>
+                <a:ea typeface="+mj-ea"/>
+                <a:cs typeface="+mj-cs"/>
+              </a:rPr>
+              <a:t>The Exception That Grounded an Airline </a:t>
+            </a:r>
+            <a:br>
+              <a:rPr lang="en-US" dirty="0"/>
+            </a:br>
+            <a:endParaRPr lang="fr-MA" dirty="0"/>
+          </a:p>
+        </p:txBody>
+      </p:sp>
+      <p:sp>
+        <p:nvSpPr>
+          <p:cNvPr id="13" name="ZoneTexte 12">
+            <a:extLst>
+              <a:ext uri="{FF2B5EF4-FFF2-40B4-BE49-F238E27FC236}">
+                <a16:creationId xmlns:a16="http://schemas.microsoft.com/office/drawing/2014/main" id="{4F69BA29-1D9F-41DD-9B70-A6FC0641A9D5}"/>
+              </a:ext>
+            </a:extLst>
+          </p:cNvPr>
+          <p:cNvSpPr txBox="1"/>
+          <p:nvPr/>
+        </p:nvSpPr>
+        <p:spPr>
+          <a:xfrm>
+            <a:off x="3035430" y="2521059"/>
+            <a:ext cx="8597245" cy="1569660"/>
+          </a:xfrm>
+          <a:prstGeom prst="rect">
+            <a:avLst/>
+          </a:prstGeom>
+          <a:noFill/>
+        </p:spPr>
+        <p:txBody>
+          <a:bodyPr wrap="square" rtlCol="0">
+            <a:spAutoFit/>
+          </a:bodyPr>
+          <a:lstStyle/>
+          <a:p>
+            <a:r>
+              <a:rPr lang="en-US" sz="2400" i="1" dirty="0"/>
+              <a:t>It started with a planned failover on the database cluster that served the Airline system, moving toward a service-oriented architecture, </a:t>
+            </a:r>
+            <a:br>
+              <a:rPr lang="en-US" sz="2400" i="1" dirty="0"/>
+            </a:br>
+            <a:endParaRPr lang="fr-MA" sz="2400" i="1" dirty="0"/>
+          </a:p>
+        </p:txBody>
+      </p:sp>
+      <p:sp>
+        <p:nvSpPr>
+          <p:cNvPr id="14" name="ZoneTexte 13">
+            <a:extLst>
+              <a:ext uri="{FF2B5EF4-FFF2-40B4-BE49-F238E27FC236}">
+                <a16:creationId xmlns:a16="http://schemas.microsoft.com/office/drawing/2014/main" id="{284691FA-D717-49BB-A40F-432C6588E1BE}"/>
+              </a:ext>
+            </a:extLst>
+          </p:cNvPr>
+          <p:cNvSpPr txBox="1"/>
+          <p:nvPr/>
+        </p:nvSpPr>
+        <p:spPr>
+          <a:xfrm>
+            <a:off x="386499" y="4213782"/>
+            <a:ext cx="10303497" cy="1200329"/>
+          </a:xfrm>
+          <a:prstGeom prst="rect">
+            <a:avLst/>
+          </a:prstGeom>
+          <a:noFill/>
+        </p:spPr>
+        <p:txBody>
+          <a:bodyPr wrap="square" rtlCol="0">
+            <a:spAutoFit/>
+          </a:bodyPr>
+          <a:lstStyle/>
+          <a:p>
+            <a:r>
+              <a:rPr lang="en-US" sz="2400" i="1" dirty="0">
+                <a:solidFill>
+                  <a:srgbClr val="FF0000"/>
+                </a:solidFill>
+              </a:rPr>
+              <a:t>At about 2:30 a.m., all the check-in kiosks went red on the monitoring console.</a:t>
+            </a:r>
+            <a:br>
+              <a:rPr lang="en-US" sz="2400" i="1" dirty="0">
+                <a:solidFill>
+                  <a:srgbClr val="FF0000"/>
+                </a:solidFill>
+              </a:rPr>
+            </a:br>
+            <a:r>
+              <a:rPr lang="en-US" sz="2400" i="1" dirty="0">
+                <a:solidFill>
+                  <a:srgbClr val="FF0000"/>
+                </a:solidFill>
+              </a:rPr>
+              <a:t>Every single one, everywhere in the country, stopped servicing requests at</a:t>
+            </a:r>
+            <a:br>
+              <a:rPr lang="en-US" sz="2400" i="1" dirty="0">
+                <a:solidFill>
+                  <a:srgbClr val="FF0000"/>
+                </a:solidFill>
+              </a:rPr>
+            </a:br>
+            <a:r>
+              <a:rPr lang="en-US" sz="2400" i="1" dirty="0">
+                <a:solidFill>
+                  <a:srgbClr val="FF0000"/>
+                </a:solidFill>
+              </a:rPr>
+              <a:t>the same time. </a:t>
+            </a:r>
+            <a:endParaRPr lang="fr-MA" sz="2400" i="1" dirty="0">
+              <a:solidFill>
+                <a:srgbClr val="FF0000"/>
+              </a:solidFill>
+            </a:endParaRPr>
+          </a:p>
+        </p:txBody>
+      </p:sp>
+    </p:spTree>
+    <p:extLst>
+      <p:ext uri="{BB962C8B-B14F-4D97-AF65-F5344CB8AC3E}">
+        <p14:creationId xmlns:p14="http://schemas.microsoft.com/office/powerpoint/2010/main" val="115056400"/>
+      </p:ext>
+    </p:extLst>
+  </p:cSld>
+  <p:clrMapOvr>
+    <a:masterClrMapping/>
+  </p:clrMapOvr>
+</p:sld>
+</file>
+
+<file path=ppt/slides/slide13.xml><?xml version="1.0" encoding="utf-8"?>
+<p:sld xmlns:a="http://schemas.openxmlformats.org/drawingml/2006/main" xmlns:r="http://schemas.openxmlformats.org/officeDocument/2006/relationships" xmlns:p="http://schemas.openxmlformats.org/presentationml/2006/main">
+  <p:cSld>
+    <p:spTree>
+      <p:nvGrpSpPr>
+        <p:cNvPr id="1" name=""/>
+        <p:cNvGrpSpPr/>
+        <p:nvPr/>
+      </p:nvGrpSpPr>
+      <p:grpSpPr>
+        <a:xfrm>
+          <a:off x="0" y="0"/>
+          <a:ext cx="0" cy="0"/>
+          <a:chOff x="0" y="0"/>
+          <a:chExt cx="0" cy="0"/>
+        </a:xfrm>
+      </p:grpSpPr>
+      <p:pic>
+        <p:nvPicPr>
+          <p:cNvPr id="10" name="Image 9">
+            <a:extLst>
+              <a:ext uri="{FF2B5EF4-FFF2-40B4-BE49-F238E27FC236}">
+                <a16:creationId xmlns:a16="http://schemas.microsoft.com/office/drawing/2014/main" id="{0ACDEC90-429A-4358-8A5C-FFC4882ABDED}"/>
+              </a:ext>
+            </a:extLst>
+          </p:cNvPr>
+          <p:cNvPicPr>
+            <a:picLocks noChangeAspect="1"/>
+          </p:cNvPicPr>
+          <p:nvPr/>
+        </p:nvPicPr>
+        <p:blipFill>
+          <a:blip r:embed="rId2">
+            <a:extLst>
+              <a:ext uri="{28A0092B-C50C-407E-A947-70E740481C1C}">
+                <a14:useLocalDpi xmlns:a14="http://schemas.microsoft.com/office/drawing/2010/main" val="0"/>
+              </a:ext>
+            </a:extLst>
+          </a:blip>
+          <a:stretch>
+            <a:fillRect/>
+          </a:stretch>
+        </p:blipFill>
+        <p:spPr>
+          <a:xfrm>
+            <a:off x="1614498" y="0"/>
+            <a:ext cx="8963004" cy="6858000"/>
+          </a:xfrm>
+          <a:prstGeom prst="rect">
+            <a:avLst/>
+          </a:prstGeom>
+        </p:spPr>
+      </p:pic>
+    </p:spTree>
+    <p:extLst>
+      <p:ext uri="{BB962C8B-B14F-4D97-AF65-F5344CB8AC3E}">
+        <p14:creationId xmlns:p14="http://schemas.microsoft.com/office/powerpoint/2010/main" val="2663904022"/>
+      </p:ext>
+    </p:extLst>
+  </p:cSld>
+  <p:clrMapOvr>
+    <a:masterClrMapping/>
+  </p:clrMapOvr>
+</p:sld>
+</file>
+
+<file path=ppt/slides/slide14.xml><?xml version="1.0" encoding="utf-8"?>
+<p:sld xmlns:a="http://schemas.openxmlformats.org/drawingml/2006/main" xmlns:r="http://schemas.openxmlformats.org/officeDocument/2006/relationships" xmlns:p="http://schemas.openxmlformats.org/presentationml/2006/main">
+  <p:cSld>
     <p:spTree>
       <p:nvGrpSpPr>
         <p:cNvPr id="1" name=""/>
@@ -4331,7 +4813,7 @@
 </p:sld>
 </file>
 
-<file path=ppt/slides/slide12.xml><?xml version="1.0" encoding="utf-8"?>
+<file path=ppt/slides/slide15.xml><?xml version="1.0" encoding="utf-8"?>
 <p:sld xmlns:a="http://schemas.openxmlformats.org/drawingml/2006/main" xmlns:r="http://schemas.openxmlformats.org/officeDocument/2006/relationships" xmlns:p="http://schemas.openxmlformats.org/presentationml/2006/main">
   <p:cSld>
     <p:spTree>
@@ -5012,7 +5494,7 @@
 </p:sld>
 </file>
 
-<file path=ppt/slides/slide13.xml><?xml version="1.0" encoding="utf-8"?>
+<file path=ppt/slides/slide16.xml><?xml version="1.0" encoding="utf-8"?>
 <p:sld xmlns:a="http://schemas.openxmlformats.org/drawingml/2006/main" xmlns:r="http://schemas.openxmlformats.org/officeDocument/2006/relationships" xmlns:p="http://schemas.openxmlformats.org/presentationml/2006/main">
   <p:cSld>
     <p:spTree>
@@ -5694,7 +6176,7 @@
 </p:sld>
 </file>
 
-<file path=ppt/slides/slide14.xml><?xml version="1.0" encoding="utf-8"?>
+<file path=ppt/slides/slide17.xml><?xml version="1.0" encoding="utf-8"?>
 <p:sld xmlns:a="http://schemas.openxmlformats.org/drawingml/2006/main" xmlns:r="http://schemas.openxmlformats.org/officeDocument/2006/relationships" xmlns:p="http://schemas.openxmlformats.org/presentationml/2006/main">
   <p:cSld>
     <p:spTree>

</xml_diff>

<commit_message>
Lambdas over Anonymous classes
</commit_message>
<xml_diff>
--- a/effective-java.pptx
+++ b/effective-java.pptx
@@ -23,6 +23,7 @@
     <p:sldId id="268" r:id="rId17"/>
     <p:sldId id="269" r:id="rId18"/>
     <p:sldId id="273" r:id="rId19"/>
+    <p:sldId id="274" r:id="rId20"/>
   </p:sldIdLst>
   <p:sldSz cx="12192000" cy="6858000"/>
   <p:notesSz cx="6858000" cy="9144000"/>
@@ -258,7 +259,7 @@
           <a:p>
             <a:fld id="{755BA608-1639-41EA-B572-74EA19863A33}" type="datetimeFigureOut">
               <a:rPr lang="fr-FR" smtClean="0"/>
-              <a:t>20/02/2020</a:t>
+              <a:t>24/02/2020</a:t>
             </a:fld>
             <a:endParaRPr lang="fr-FR"/>
           </a:p>
@@ -426,7 +427,7 @@
           <a:p>
             <a:fld id="{755BA608-1639-41EA-B572-74EA19863A33}" type="datetimeFigureOut">
               <a:rPr lang="fr-FR" smtClean="0"/>
-              <a:t>20/02/2020</a:t>
+              <a:t>24/02/2020</a:t>
             </a:fld>
             <a:endParaRPr lang="fr-FR"/>
           </a:p>
@@ -604,7 +605,7 @@
           <a:p>
             <a:fld id="{755BA608-1639-41EA-B572-74EA19863A33}" type="datetimeFigureOut">
               <a:rPr lang="fr-FR" smtClean="0"/>
-              <a:t>20/02/2020</a:t>
+              <a:t>24/02/2020</a:t>
             </a:fld>
             <a:endParaRPr lang="fr-FR"/>
           </a:p>
@@ -772,7 +773,7 @@
           <a:p>
             <a:fld id="{755BA608-1639-41EA-B572-74EA19863A33}" type="datetimeFigureOut">
               <a:rPr lang="fr-FR" smtClean="0"/>
-              <a:t>20/02/2020</a:t>
+              <a:t>24/02/2020</a:t>
             </a:fld>
             <a:endParaRPr lang="fr-FR"/>
           </a:p>
@@ -1017,7 +1018,7 @@
           <a:p>
             <a:fld id="{755BA608-1639-41EA-B572-74EA19863A33}" type="datetimeFigureOut">
               <a:rPr lang="fr-FR" smtClean="0"/>
-              <a:t>20/02/2020</a:t>
+              <a:t>24/02/2020</a:t>
             </a:fld>
             <a:endParaRPr lang="fr-FR"/>
           </a:p>
@@ -1246,7 +1247,7 @@
           <a:p>
             <a:fld id="{755BA608-1639-41EA-B572-74EA19863A33}" type="datetimeFigureOut">
               <a:rPr lang="fr-FR" smtClean="0"/>
-              <a:t>20/02/2020</a:t>
+              <a:t>24/02/2020</a:t>
             </a:fld>
             <a:endParaRPr lang="fr-FR"/>
           </a:p>
@@ -1610,7 +1611,7 @@
           <a:p>
             <a:fld id="{755BA608-1639-41EA-B572-74EA19863A33}" type="datetimeFigureOut">
               <a:rPr lang="fr-FR" smtClean="0"/>
-              <a:t>20/02/2020</a:t>
+              <a:t>24/02/2020</a:t>
             </a:fld>
             <a:endParaRPr lang="fr-FR"/>
           </a:p>
@@ -1727,7 +1728,7 @@
           <a:p>
             <a:fld id="{755BA608-1639-41EA-B572-74EA19863A33}" type="datetimeFigureOut">
               <a:rPr lang="fr-FR" smtClean="0"/>
-              <a:t>20/02/2020</a:t>
+              <a:t>24/02/2020</a:t>
             </a:fld>
             <a:endParaRPr lang="fr-FR"/>
           </a:p>
@@ -1822,7 +1823,7 @@
           <a:p>
             <a:fld id="{755BA608-1639-41EA-B572-74EA19863A33}" type="datetimeFigureOut">
               <a:rPr lang="fr-FR" smtClean="0"/>
-              <a:t>20/02/2020</a:t>
+              <a:t>24/02/2020</a:t>
             </a:fld>
             <a:endParaRPr lang="fr-FR"/>
           </a:p>
@@ -2097,7 +2098,7 @@
           <a:p>
             <a:fld id="{755BA608-1639-41EA-B572-74EA19863A33}" type="datetimeFigureOut">
               <a:rPr lang="fr-FR" smtClean="0"/>
-              <a:t>20/02/2020</a:t>
+              <a:t>24/02/2020</a:t>
             </a:fld>
             <a:endParaRPr lang="fr-FR"/>
           </a:p>
@@ -2349,7 +2350,7 @@
           <a:p>
             <a:fld id="{755BA608-1639-41EA-B572-74EA19863A33}" type="datetimeFigureOut">
               <a:rPr lang="fr-FR" smtClean="0"/>
-              <a:t>20/02/2020</a:t>
+              <a:t>24/02/2020</a:t>
             </a:fld>
             <a:endParaRPr lang="fr-FR"/>
           </a:p>
@@ -2560,7 +2561,7 @@
           <a:p>
             <a:fld id="{755BA608-1639-41EA-B572-74EA19863A33}" type="datetimeFigureOut">
               <a:rPr lang="fr-FR" smtClean="0"/>
-              <a:t>20/02/2020</a:t>
+              <a:t>24/02/2020</a:t>
             </a:fld>
             <a:endParaRPr lang="fr-FR"/>
           </a:p>
@@ -7817,6 +7818,693 @@
 </p:sld>
 </file>
 
+<file path=ppt/slides/slide19.xml><?xml version="1.0" encoding="utf-8"?>
+<p:sld xmlns:a="http://schemas.openxmlformats.org/drawingml/2006/main" xmlns:r="http://schemas.openxmlformats.org/officeDocument/2006/relationships" xmlns:p="http://schemas.openxmlformats.org/presentationml/2006/main">
+  <p:cSld>
+    <p:spTree>
+      <p:nvGrpSpPr>
+        <p:cNvPr id="1" name=""/>
+        <p:cNvGrpSpPr/>
+        <p:nvPr/>
+      </p:nvGrpSpPr>
+      <p:grpSpPr>
+        <a:xfrm>
+          <a:off x="0" y="0"/>
+          <a:ext cx="0" cy="0"/>
+          <a:chOff x="0" y="0"/>
+          <a:chExt cx="0" cy="0"/>
+        </a:xfrm>
+      </p:grpSpPr>
+      <p:sp>
+        <p:nvSpPr>
+          <p:cNvPr id="2" name="Titre 1"/>
+          <p:cNvSpPr>
+            <a:spLocks noGrp="1"/>
+          </p:cNvSpPr>
+          <p:nvPr>
+            <p:ph type="ctrTitle"/>
+          </p:nvPr>
+        </p:nvSpPr>
+        <p:spPr>
+          <a:xfrm>
+            <a:off x="1030224" y="384048"/>
+            <a:ext cx="9144000" cy="1287970"/>
+          </a:xfrm>
+        </p:spPr>
+        <p:txBody>
+          <a:bodyPr/>
+          <a:lstStyle/>
+          <a:p>
+            <a:r>
+              <a:rPr lang="fr-FR" dirty="0"/>
+              <a:t>Item 42</a:t>
+            </a:r>
+          </a:p>
+        </p:txBody>
+      </p:sp>
+      <p:sp>
+        <p:nvSpPr>
+          <p:cNvPr id="3" name="Sous-titre 2"/>
+          <p:cNvSpPr>
+            <a:spLocks noGrp="1"/>
+          </p:cNvSpPr>
+          <p:nvPr>
+            <p:ph type="subTitle" idx="1"/>
+          </p:nvPr>
+        </p:nvSpPr>
+        <p:spPr>
+          <a:xfrm>
+            <a:off x="1285690" y="1900406"/>
+            <a:ext cx="9144000" cy="4408106"/>
+          </a:xfrm>
+        </p:spPr>
+        <p:txBody>
+          <a:bodyPr>
+            <a:noAutofit/>
+          </a:bodyPr>
+          <a:lstStyle/>
+          <a:p>
+            <a:pPr algn="l"/>
+            <a:r>
+              <a:rPr lang="en-US" sz="2000" dirty="0"/>
+              <a:t>How to declare a function object? (e.g. Strategy / Command pattern ,,,)</a:t>
+            </a:r>
+          </a:p>
+          <a:p>
+            <a:pPr algn="l"/>
+            <a:r>
+              <a:rPr lang="en-US" sz="2000" b="1" dirty="0">
+                <a:solidFill>
+                  <a:srgbClr val="0070C0"/>
+                </a:solidFill>
+                <a:sym typeface="Wingdings" panose="05000000000000000000" pitchFamily="2" charset="2"/>
+              </a:rPr>
+              <a:t>            Anonymous class</a:t>
+            </a:r>
+          </a:p>
+          <a:p>
+            <a:pPr algn="l"/>
+            <a:endParaRPr lang="en-US" sz="2000" b="1" dirty="0">
+              <a:solidFill>
+                <a:srgbClr val="0070C0"/>
+              </a:solidFill>
+              <a:sym typeface="Wingdings" panose="05000000000000000000" pitchFamily="2" charset="2"/>
+            </a:endParaRPr>
+          </a:p>
+          <a:p>
+            <a:pPr algn="l"/>
+            <a:endParaRPr lang="en-US" sz="2000" dirty="0"/>
+          </a:p>
+          <a:p>
+            <a:pPr algn="l"/>
+            <a:r>
+              <a:rPr lang="en-US" sz="2000" dirty="0"/>
+              <a:t>But How to:</a:t>
+            </a:r>
+          </a:p>
+          <a:p>
+            <a:pPr marL="342900" indent="-342900" algn="l">
+              <a:buFont typeface="Wingdings" panose="05000000000000000000" pitchFamily="2" charset="2"/>
+              <a:buChar char="q"/>
+            </a:pPr>
+            <a:r>
+              <a:rPr lang="en-US" sz="2000" dirty="0"/>
+              <a:t>Avoid Anonymous class verbosity? </a:t>
+            </a:r>
+          </a:p>
+          <a:p>
+            <a:pPr marL="342900" indent="-342900" algn="l">
+              <a:buFont typeface="Wingdings" panose="05000000000000000000" pitchFamily="2" charset="2"/>
+              <a:buChar char="q"/>
+            </a:pPr>
+            <a:r>
+              <a:rPr lang="en-US" sz="2000" dirty="0"/>
+              <a:t>To Enforce type Safety?</a:t>
+            </a:r>
+          </a:p>
+        </p:txBody>
+      </p:sp>
+      <p:sp>
+        <p:nvSpPr>
+          <p:cNvPr id="4" name="Rectangle 3"/>
+          <p:cNvSpPr/>
+          <p:nvPr/>
+        </p:nvSpPr>
+        <p:spPr>
+          <a:xfrm>
+            <a:off x="3181070" y="5097887"/>
+            <a:ext cx="5884753" cy="523220"/>
+          </a:xfrm>
+          <a:prstGeom prst="rect">
+            <a:avLst/>
+          </a:prstGeom>
+          <a:noFill/>
+        </p:spPr>
+        <p:txBody>
+          <a:bodyPr wrap="none" lIns="91440" tIns="45720" rIns="91440" bIns="45720">
+            <a:spAutoFit/>
+          </a:bodyPr>
+          <a:lstStyle/>
+          <a:p>
+            <a:pPr algn="ctr"/>
+            <a:r>
+              <a:rPr lang="en-US" sz="2800" b="1" dirty="0">
+                <a:ln w="22225">
+                  <a:solidFill>
+                    <a:schemeClr val="accent2"/>
+                  </a:solidFill>
+                  <a:prstDash val="solid"/>
+                </a:ln>
+                <a:solidFill>
+                  <a:schemeClr val="accent2">
+                    <a:lumMod val="40000"/>
+                    <a:lumOff val="60000"/>
+                  </a:schemeClr>
+                </a:solidFill>
+              </a:rPr>
+              <a:t>Use functional interface, aka lambdas.</a:t>
+            </a:r>
+            <a:endParaRPr lang="fr-FR" sz="2800" b="1" cap="none" spc="0" dirty="0">
+              <a:ln w="22225">
+                <a:solidFill>
+                  <a:schemeClr val="accent2"/>
+                </a:solidFill>
+                <a:prstDash val="solid"/>
+              </a:ln>
+              <a:solidFill>
+                <a:schemeClr val="accent2">
+                  <a:lumMod val="40000"/>
+                  <a:lumOff val="60000"/>
+                </a:schemeClr>
+              </a:solidFill>
+              <a:effectLst/>
+            </a:endParaRPr>
+          </a:p>
+        </p:txBody>
+      </p:sp>
+    </p:spTree>
+    <p:extLst>
+      <p:ext uri="{BB962C8B-B14F-4D97-AF65-F5344CB8AC3E}">
+        <p14:creationId xmlns:p14="http://schemas.microsoft.com/office/powerpoint/2010/main" val="1024839691"/>
+      </p:ext>
+    </p:extLst>
+  </p:cSld>
+  <p:clrMapOvr>
+    <a:masterClrMapping/>
+  </p:clrMapOvr>
+  <p:timing>
+    <p:tnLst>
+      <p:par>
+        <p:cTn id="1" dur="indefinite" restart="never" nodeType="tmRoot">
+          <p:childTnLst>
+            <p:seq concurrent="1" nextAc="seek">
+              <p:cTn id="2" dur="indefinite" nodeType="mainSeq">
+                <p:childTnLst>
+                  <p:par>
+                    <p:cTn id="3" fill="hold">
+                      <p:stCondLst>
+                        <p:cond delay="indefinite"/>
+                      </p:stCondLst>
+                      <p:childTnLst>
+                        <p:par>
+                          <p:cTn id="4" fill="hold">
+                            <p:stCondLst>
+                              <p:cond delay="0"/>
+                            </p:stCondLst>
+                            <p:childTnLst>
+                              <p:par>
+                                <p:cTn id="5" presetID="1" presetClass="entr" presetSubtype="0" fill="hold" nodeType="clickEffect">
+                                  <p:stCondLst>
+                                    <p:cond delay="0"/>
+                                  </p:stCondLst>
+                                  <p:childTnLst>
+                                    <p:set>
+                                      <p:cBhvr>
+                                        <p:cTn id="6" dur="1" fill="hold">
+                                          <p:stCondLst>
+                                            <p:cond delay="0"/>
+                                          </p:stCondLst>
+                                        </p:cTn>
+                                        <p:tgtEl>
+                                          <p:spTgt spid="3">
+                                            <p:txEl>
+                                              <p:pRg st="1" end="1"/>
+                                            </p:txEl>
+                                          </p:spTgt>
+                                        </p:tgtEl>
+                                        <p:attrNameLst>
+                                          <p:attrName>style.visibility</p:attrName>
+                                        </p:attrNameLst>
+                                      </p:cBhvr>
+                                      <p:to>
+                                        <p:strVal val="visible"/>
+                                      </p:to>
+                                    </p:set>
+                                  </p:childTnLst>
+                                </p:cTn>
+                              </p:par>
+                            </p:childTnLst>
+                          </p:cTn>
+                        </p:par>
+                      </p:childTnLst>
+                    </p:cTn>
+                  </p:par>
+                  <p:par>
+                    <p:cTn id="7" fill="hold">
+                      <p:stCondLst>
+                        <p:cond delay="indefinite"/>
+                      </p:stCondLst>
+                      <p:childTnLst>
+                        <p:par>
+                          <p:cTn id="8" fill="hold">
+                            <p:stCondLst>
+                              <p:cond delay="0"/>
+                            </p:stCondLst>
+                            <p:childTnLst>
+                              <p:par>
+                                <p:cTn id="9" presetID="2" presetClass="entr" presetSubtype="4" fill="hold" nodeType="clickEffect">
+                                  <p:stCondLst>
+                                    <p:cond delay="0"/>
+                                  </p:stCondLst>
+                                  <p:childTnLst>
+                                    <p:set>
+                                      <p:cBhvr>
+                                        <p:cTn id="10" dur="1" fill="hold">
+                                          <p:stCondLst>
+                                            <p:cond delay="0"/>
+                                          </p:stCondLst>
+                                        </p:cTn>
+                                        <p:tgtEl>
+                                          <p:spTgt spid="3">
+                                            <p:txEl>
+                                              <p:pRg st="4" end="4"/>
+                                            </p:txEl>
+                                          </p:spTgt>
+                                        </p:tgtEl>
+                                        <p:attrNameLst>
+                                          <p:attrName>style.visibility</p:attrName>
+                                        </p:attrNameLst>
+                                      </p:cBhvr>
+                                      <p:to>
+                                        <p:strVal val="visible"/>
+                                      </p:to>
+                                    </p:set>
+                                    <p:anim calcmode="lin" valueType="num">
+                                      <p:cBhvr additive="base">
+                                        <p:cTn id="11" dur="500" fill="hold"/>
+                                        <p:tgtEl>
+                                          <p:spTgt spid="3">
+                                            <p:txEl>
+                                              <p:pRg st="4" end="4"/>
+                                            </p:txEl>
+                                          </p:spTgt>
+                                        </p:tgtEl>
+                                        <p:attrNameLst>
+                                          <p:attrName>ppt_x</p:attrName>
+                                        </p:attrNameLst>
+                                      </p:cBhvr>
+                                      <p:tavLst>
+                                        <p:tav tm="0">
+                                          <p:val>
+                                            <p:strVal val="#ppt_x"/>
+                                          </p:val>
+                                        </p:tav>
+                                        <p:tav tm="100000">
+                                          <p:val>
+                                            <p:strVal val="#ppt_x"/>
+                                          </p:val>
+                                        </p:tav>
+                                      </p:tavLst>
+                                    </p:anim>
+                                    <p:anim calcmode="lin" valueType="num">
+                                      <p:cBhvr additive="base">
+                                        <p:cTn id="12" dur="500" fill="hold"/>
+                                        <p:tgtEl>
+                                          <p:spTgt spid="3">
+                                            <p:txEl>
+                                              <p:pRg st="4" end="4"/>
+                                            </p:txEl>
+                                          </p:spTgt>
+                                        </p:tgtEl>
+                                        <p:attrNameLst>
+                                          <p:attrName>ppt_y</p:attrName>
+                                        </p:attrNameLst>
+                                      </p:cBhvr>
+                                      <p:tavLst>
+                                        <p:tav tm="0">
+                                          <p:val>
+                                            <p:strVal val="1+#ppt_h/2"/>
+                                          </p:val>
+                                        </p:tav>
+                                        <p:tav tm="100000">
+                                          <p:val>
+                                            <p:strVal val="#ppt_y"/>
+                                          </p:val>
+                                        </p:tav>
+                                      </p:tavLst>
+                                    </p:anim>
+                                  </p:childTnLst>
+                                </p:cTn>
+                              </p:par>
+                            </p:childTnLst>
+                          </p:cTn>
+                        </p:par>
+                      </p:childTnLst>
+                    </p:cTn>
+                  </p:par>
+                  <p:par>
+                    <p:cTn id="13" fill="hold">
+                      <p:stCondLst>
+                        <p:cond delay="indefinite"/>
+                      </p:stCondLst>
+                      <p:childTnLst>
+                        <p:par>
+                          <p:cTn id="14" fill="hold">
+                            <p:stCondLst>
+                              <p:cond delay="0"/>
+                            </p:stCondLst>
+                            <p:childTnLst>
+                              <p:par>
+                                <p:cTn id="15" presetID="2" presetClass="entr" presetSubtype="4" fill="hold" nodeType="clickEffect">
+                                  <p:stCondLst>
+                                    <p:cond delay="0"/>
+                                  </p:stCondLst>
+                                  <p:childTnLst>
+                                    <p:set>
+                                      <p:cBhvr>
+                                        <p:cTn id="16" dur="1" fill="hold">
+                                          <p:stCondLst>
+                                            <p:cond delay="0"/>
+                                          </p:stCondLst>
+                                        </p:cTn>
+                                        <p:tgtEl>
+                                          <p:spTgt spid="3">
+                                            <p:txEl>
+                                              <p:pRg st="5" end="5"/>
+                                            </p:txEl>
+                                          </p:spTgt>
+                                        </p:tgtEl>
+                                        <p:attrNameLst>
+                                          <p:attrName>style.visibility</p:attrName>
+                                        </p:attrNameLst>
+                                      </p:cBhvr>
+                                      <p:to>
+                                        <p:strVal val="visible"/>
+                                      </p:to>
+                                    </p:set>
+                                    <p:anim calcmode="lin" valueType="num">
+                                      <p:cBhvr additive="base">
+                                        <p:cTn id="17" dur="500" fill="hold"/>
+                                        <p:tgtEl>
+                                          <p:spTgt spid="3">
+                                            <p:txEl>
+                                              <p:pRg st="5" end="5"/>
+                                            </p:txEl>
+                                          </p:spTgt>
+                                        </p:tgtEl>
+                                        <p:attrNameLst>
+                                          <p:attrName>ppt_x</p:attrName>
+                                        </p:attrNameLst>
+                                      </p:cBhvr>
+                                      <p:tavLst>
+                                        <p:tav tm="0">
+                                          <p:val>
+                                            <p:strVal val="#ppt_x"/>
+                                          </p:val>
+                                        </p:tav>
+                                        <p:tav tm="100000">
+                                          <p:val>
+                                            <p:strVal val="#ppt_x"/>
+                                          </p:val>
+                                        </p:tav>
+                                      </p:tavLst>
+                                    </p:anim>
+                                    <p:anim calcmode="lin" valueType="num">
+                                      <p:cBhvr additive="base">
+                                        <p:cTn id="18" dur="500" fill="hold"/>
+                                        <p:tgtEl>
+                                          <p:spTgt spid="3">
+                                            <p:txEl>
+                                              <p:pRg st="5" end="5"/>
+                                            </p:txEl>
+                                          </p:spTgt>
+                                        </p:tgtEl>
+                                        <p:attrNameLst>
+                                          <p:attrName>ppt_y</p:attrName>
+                                        </p:attrNameLst>
+                                      </p:cBhvr>
+                                      <p:tavLst>
+                                        <p:tav tm="0">
+                                          <p:val>
+                                            <p:strVal val="1+#ppt_h/2"/>
+                                          </p:val>
+                                        </p:tav>
+                                        <p:tav tm="100000">
+                                          <p:val>
+                                            <p:strVal val="#ppt_y"/>
+                                          </p:val>
+                                        </p:tav>
+                                      </p:tavLst>
+                                    </p:anim>
+                                  </p:childTnLst>
+                                </p:cTn>
+                              </p:par>
+                            </p:childTnLst>
+                          </p:cTn>
+                        </p:par>
+                      </p:childTnLst>
+                    </p:cTn>
+                  </p:par>
+                  <p:par>
+                    <p:cTn id="19" fill="hold">
+                      <p:stCondLst>
+                        <p:cond delay="indefinite"/>
+                      </p:stCondLst>
+                      <p:childTnLst>
+                        <p:par>
+                          <p:cTn id="20" fill="hold">
+                            <p:stCondLst>
+                              <p:cond delay="0"/>
+                            </p:stCondLst>
+                            <p:childTnLst>
+                              <p:par>
+                                <p:cTn id="21" presetID="2" presetClass="entr" presetSubtype="4" fill="hold" nodeType="clickEffect">
+                                  <p:stCondLst>
+                                    <p:cond delay="0"/>
+                                  </p:stCondLst>
+                                  <p:childTnLst>
+                                    <p:set>
+                                      <p:cBhvr>
+                                        <p:cTn id="22" dur="1" fill="hold">
+                                          <p:stCondLst>
+                                            <p:cond delay="0"/>
+                                          </p:stCondLst>
+                                        </p:cTn>
+                                        <p:tgtEl>
+                                          <p:spTgt spid="3">
+                                            <p:txEl>
+                                              <p:pRg st="6" end="6"/>
+                                            </p:txEl>
+                                          </p:spTgt>
+                                        </p:tgtEl>
+                                        <p:attrNameLst>
+                                          <p:attrName>style.visibility</p:attrName>
+                                        </p:attrNameLst>
+                                      </p:cBhvr>
+                                      <p:to>
+                                        <p:strVal val="visible"/>
+                                      </p:to>
+                                    </p:set>
+                                    <p:anim calcmode="lin" valueType="num">
+                                      <p:cBhvr additive="base">
+                                        <p:cTn id="23" dur="500" fill="hold"/>
+                                        <p:tgtEl>
+                                          <p:spTgt spid="3">
+                                            <p:txEl>
+                                              <p:pRg st="6" end="6"/>
+                                            </p:txEl>
+                                          </p:spTgt>
+                                        </p:tgtEl>
+                                        <p:attrNameLst>
+                                          <p:attrName>ppt_x</p:attrName>
+                                        </p:attrNameLst>
+                                      </p:cBhvr>
+                                      <p:tavLst>
+                                        <p:tav tm="0">
+                                          <p:val>
+                                            <p:strVal val="#ppt_x"/>
+                                          </p:val>
+                                        </p:tav>
+                                        <p:tav tm="100000">
+                                          <p:val>
+                                            <p:strVal val="#ppt_x"/>
+                                          </p:val>
+                                        </p:tav>
+                                      </p:tavLst>
+                                    </p:anim>
+                                    <p:anim calcmode="lin" valueType="num">
+                                      <p:cBhvr additive="base">
+                                        <p:cTn id="24" dur="500" fill="hold"/>
+                                        <p:tgtEl>
+                                          <p:spTgt spid="3">
+                                            <p:txEl>
+                                              <p:pRg st="6" end="6"/>
+                                            </p:txEl>
+                                          </p:spTgt>
+                                        </p:tgtEl>
+                                        <p:attrNameLst>
+                                          <p:attrName>ppt_y</p:attrName>
+                                        </p:attrNameLst>
+                                      </p:cBhvr>
+                                      <p:tavLst>
+                                        <p:tav tm="0">
+                                          <p:val>
+                                            <p:strVal val="1+#ppt_h/2"/>
+                                          </p:val>
+                                        </p:tav>
+                                        <p:tav tm="100000">
+                                          <p:val>
+                                            <p:strVal val="#ppt_y"/>
+                                          </p:val>
+                                        </p:tav>
+                                      </p:tavLst>
+                                    </p:anim>
+                                  </p:childTnLst>
+                                </p:cTn>
+                              </p:par>
+                            </p:childTnLst>
+                          </p:cTn>
+                        </p:par>
+                      </p:childTnLst>
+                    </p:cTn>
+                  </p:par>
+                  <p:par>
+                    <p:cTn id="25" fill="hold">
+                      <p:stCondLst>
+                        <p:cond delay="indefinite"/>
+                      </p:stCondLst>
+                      <p:childTnLst>
+                        <p:par>
+                          <p:cTn id="26" fill="hold">
+                            <p:stCondLst>
+                              <p:cond delay="0"/>
+                            </p:stCondLst>
+                            <p:childTnLst>
+                              <p:par>
+                                <p:cTn id="27" presetID="53" presetClass="entr" presetSubtype="16" fill="hold" grpId="0" nodeType="clickEffect">
+                                  <p:stCondLst>
+                                    <p:cond delay="0"/>
+                                  </p:stCondLst>
+                                  <p:childTnLst>
+                                    <p:set>
+                                      <p:cBhvr>
+                                        <p:cTn id="28" dur="1" fill="hold">
+                                          <p:stCondLst>
+                                            <p:cond delay="0"/>
+                                          </p:stCondLst>
+                                        </p:cTn>
+                                        <p:tgtEl>
+                                          <p:spTgt spid="4"/>
+                                        </p:tgtEl>
+                                        <p:attrNameLst>
+                                          <p:attrName>style.visibility</p:attrName>
+                                        </p:attrNameLst>
+                                      </p:cBhvr>
+                                      <p:to>
+                                        <p:strVal val="visible"/>
+                                      </p:to>
+                                    </p:set>
+                                    <p:anim calcmode="lin" valueType="num">
+                                      <p:cBhvr>
+                                        <p:cTn id="29" dur="500" fill="hold"/>
+                                        <p:tgtEl>
+                                          <p:spTgt spid="4"/>
+                                        </p:tgtEl>
+                                        <p:attrNameLst>
+                                          <p:attrName>ppt_w</p:attrName>
+                                        </p:attrNameLst>
+                                      </p:cBhvr>
+                                      <p:tavLst>
+                                        <p:tav tm="0">
+                                          <p:val>
+                                            <p:fltVal val="0"/>
+                                          </p:val>
+                                        </p:tav>
+                                        <p:tav tm="100000">
+                                          <p:val>
+                                            <p:strVal val="#ppt_w"/>
+                                          </p:val>
+                                        </p:tav>
+                                      </p:tavLst>
+                                    </p:anim>
+                                    <p:anim calcmode="lin" valueType="num">
+                                      <p:cBhvr>
+                                        <p:cTn id="30" dur="500" fill="hold"/>
+                                        <p:tgtEl>
+                                          <p:spTgt spid="4"/>
+                                        </p:tgtEl>
+                                        <p:attrNameLst>
+                                          <p:attrName>ppt_h</p:attrName>
+                                        </p:attrNameLst>
+                                      </p:cBhvr>
+                                      <p:tavLst>
+                                        <p:tav tm="0">
+                                          <p:val>
+                                            <p:fltVal val="0"/>
+                                          </p:val>
+                                        </p:tav>
+                                        <p:tav tm="100000">
+                                          <p:val>
+                                            <p:strVal val="#ppt_h"/>
+                                          </p:val>
+                                        </p:tav>
+                                      </p:tavLst>
+                                    </p:anim>
+                                    <p:animEffect transition="in" filter="fade">
+                                      <p:cBhvr>
+                                        <p:cTn id="31" dur="500"/>
+                                        <p:tgtEl>
+                                          <p:spTgt spid="4"/>
+                                        </p:tgtEl>
+                                      </p:cBhvr>
+                                    </p:animEffect>
+                                  </p:childTnLst>
+                                </p:cTn>
+                              </p:par>
+                            </p:childTnLst>
+                          </p:cTn>
+                        </p:par>
+                      </p:childTnLst>
+                    </p:cTn>
+                  </p:par>
+                </p:childTnLst>
+              </p:cTn>
+              <p:prevCondLst>
+                <p:cond evt="onPrev" delay="0">
+                  <p:tgtEl>
+                    <p:sldTgt/>
+                  </p:tgtEl>
+                </p:cond>
+              </p:prevCondLst>
+              <p:nextCondLst>
+                <p:cond evt="onNext" delay="0">
+                  <p:tgtEl>
+                    <p:sldTgt/>
+                  </p:tgtEl>
+                </p:cond>
+              </p:nextCondLst>
+            </p:seq>
+          </p:childTnLst>
+        </p:cTn>
+      </p:par>
+    </p:tnLst>
+    <p:bldLst>
+      <p:bldP spid="4" grpId="0"/>
+    </p:bldLst>
+  </p:timing>
+</p:sld>
+</file>
+
 <file path=ppt/slides/slide2.xml><?xml version="1.0" encoding="utf-8"?>
 <p:sld xmlns:a="http://schemas.openxmlformats.org/drawingml/2006/main" xmlns:r="http://schemas.openxmlformats.org/officeDocument/2006/relationships" xmlns:p="http://schemas.openxmlformats.org/presentationml/2006/main">
   <p:cSld>

</xml_diff>